<commit_message>
title page + structure
</commit_message>
<xml_diff>
--- a/presentation/Presentation.pptx
+++ b/presentation/Presentation.pptx
@@ -1,14 +1,20 @@
 
 <file path=ppt/presentation.xml><?xml version="1.0" encoding="utf-8"?>
-<p:presentation xmlns:a="http://schemas.openxmlformats.org/drawingml/2006/main" xmlns:r="http://schemas.openxmlformats.org/officeDocument/2006/relationships" xmlns:p="http://schemas.openxmlformats.org/presentationml/2006/main" saveSubsetFonts="1">
+<p:presentation xmlns:a="http://schemas.openxmlformats.org/drawingml/2006/main" xmlns:r="http://schemas.openxmlformats.org/officeDocument/2006/relationships" xmlns:p="http://schemas.openxmlformats.org/presentationml/2006/main">
   <p:sldMasterIdLst>
     <p:sldMasterId id="2147483648" r:id="rId1"/>
   </p:sldMasterIdLst>
   <p:sldIdLst>
-    <p:sldId id="256" r:id="rId2"/>
+    <p:sldId id="256" r:id="rId3"/>
+    <p:sldId id="260" r:id="rId4"/>
+    <p:sldId id="261" r:id="rId5"/>
+    <p:sldId id="262" r:id="rId6"/>
   </p:sldIdLst>
   <p:sldSz cx="12192000" cy="6858000"/>
   <p:notesSz cx="6858000" cy="9144000"/>
+  <p:custDataLst>
+    <p:tags r:id="rId10"/>
+  </p:custDataLst>
   <p:defaultTextStyle>
     <a:defPPr>
       <a:defRPr lang="en-US"/>
@@ -238,7 +244,6 @@
           <a:p>
             <a:fld id="{63A1C593-65D0-4073-BCC9-577B9352EA97}" type="datetimeFigureOut">
               <a:rPr lang="en-US" smtClean="0"/>
-              <a:t>11/27/2015</a:t>
             </a:fld>
             <a:endParaRPr lang="en-US"/>
           </a:p>
@@ -280,18 +285,12 @@
           <a:p>
             <a:fld id="{9B618960-8005-486C-9A75-10CB2AAC16F9}" type="slidenum">
               <a:rPr lang="en-US" smtClean="0"/>
-              <a:t>‹#›</a:t>
             </a:fld>
             <a:endParaRPr lang="en-US"/>
           </a:p>
         </p:txBody>
       </p:sp>
     </p:spTree>
-    <p:extLst>
-      <p:ext uri="{BB962C8B-B14F-4D97-AF65-F5344CB8AC3E}">
-        <p14:creationId xmlns:p14="http://schemas.microsoft.com/office/powerpoint/2010/main" val="4001249340"/>
-      </p:ext>
-    </p:extLst>
   </p:cSld>
   <p:clrMapOvr>
     <a:masterClrMapping/>
@@ -359,6 +358,7 @@
               <a:rPr lang="en-US" smtClean="0"/>
               <a:t>Click to edit Master text styles</a:t>
             </a:r>
+            <a:endParaRPr lang="en-US" smtClean="0"/>
           </a:p>
           <a:p>
             <a:pPr lvl="1"/>
@@ -366,6 +366,7 @@
               <a:rPr lang="en-US" smtClean="0"/>
               <a:t>Second level</a:t>
             </a:r>
+            <a:endParaRPr lang="en-US" smtClean="0"/>
           </a:p>
           <a:p>
             <a:pPr lvl="2"/>
@@ -373,6 +374,7 @@
               <a:rPr lang="en-US" smtClean="0"/>
               <a:t>Third level</a:t>
             </a:r>
+            <a:endParaRPr lang="en-US" smtClean="0"/>
           </a:p>
           <a:p>
             <a:pPr lvl="3"/>
@@ -380,6 +382,7 @@
               <a:rPr lang="en-US" smtClean="0"/>
               <a:t>Fourth level</a:t>
             </a:r>
+            <a:endParaRPr lang="en-US" smtClean="0"/>
           </a:p>
           <a:p>
             <a:pPr lvl="4"/>
@@ -408,7 +411,6 @@
           <a:p>
             <a:fld id="{63A1C593-65D0-4073-BCC9-577B9352EA97}" type="datetimeFigureOut">
               <a:rPr lang="en-US" smtClean="0"/>
-              <a:t>11/27/2015</a:t>
             </a:fld>
             <a:endParaRPr lang="en-US"/>
           </a:p>
@@ -450,18 +452,12 @@
           <a:p>
             <a:fld id="{9B618960-8005-486C-9A75-10CB2AAC16F9}" type="slidenum">
               <a:rPr lang="en-US" smtClean="0"/>
-              <a:t>‹#›</a:t>
             </a:fld>
             <a:endParaRPr lang="en-US"/>
           </a:p>
         </p:txBody>
       </p:sp>
     </p:spTree>
-    <p:extLst>
-      <p:ext uri="{BB962C8B-B14F-4D97-AF65-F5344CB8AC3E}">
-        <p14:creationId xmlns:p14="http://schemas.microsoft.com/office/powerpoint/2010/main" val="682560079"/>
-      </p:ext>
-    </p:extLst>
   </p:cSld>
   <p:clrMapOvr>
     <a:masterClrMapping/>
@@ -539,6 +535,7 @@
               <a:rPr lang="en-US" smtClean="0"/>
               <a:t>Click to edit Master text styles</a:t>
             </a:r>
+            <a:endParaRPr lang="en-US" smtClean="0"/>
           </a:p>
           <a:p>
             <a:pPr lvl="1"/>
@@ -546,6 +543,7 @@
               <a:rPr lang="en-US" smtClean="0"/>
               <a:t>Second level</a:t>
             </a:r>
+            <a:endParaRPr lang="en-US" smtClean="0"/>
           </a:p>
           <a:p>
             <a:pPr lvl="2"/>
@@ -553,6 +551,7 @@
               <a:rPr lang="en-US" smtClean="0"/>
               <a:t>Third level</a:t>
             </a:r>
+            <a:endParaRPr lang="en-US" smtClean="0"/>
           </a:p>
           <a:p>
             <a:pPr lvl="3"/>
@@ -560,6 +559,7 @@
               <a:rPr lang="en-US" smtClean="0"/>
               <a:t>Fourth level</a:t>
             </a:r>
+            <a:endParaRPr lang="en-US" smtClean="0"/>
           </a:p>
           <a:p>
             <a:pPr lvl="4"/>
@@ -588,7 +588,6 @@
           <a:p>
             <a:fld id="{63A1C593-65D0-4073-BCC9-577B9352EA97}" type="datetimeFigureOut">
               <a:rPr lang="en-US" smtClean="0"/>
-              <a:t>11/27/2015</a:t>
             </a:fld>
             <a:endParaRPr lang="en-US"/>
           </a:p>
@@ -630,18 +629,12 @@
           <a:p>
             <a:fld id="{9B618960-8005-486C-9A75-10CB2AAC16F9}" type="slidenum">
               <a:rPr lang="en-US" smtClean="0"/>
-              <a:t>‹#›</a:t>
             </a:fld>
             <a:endParaRPr lang="en-US"/>
           </a:p>
         </p:txBody>
       </p:sp>
     </p:spTree>
-    <p:extLst>
-      <p:ext uri="{BB962C8B-B14F-4D97-AF65-F5344CB8AC3E}">
-        <p14:creationId xmlns:p14="http://schemas.microsoft.com/office/powerpoint/2010/main" val="3435286789"/>
-      </p:ext>
-    </p:extLst>
   </p:cSld>
   <p:clrMapOvr>
     <a:masterClrMapping/>
@@ -709,6 +702,7 @@
               <a:rPr lang="en-US" smtClean="0"/>
               <a:t>Click to edit Master text styles</a:t>
             </a:r>
+            <a:endParaRPr lang="en-US" smtClean="0"/>
           </a:p>
           <a:p>
             <a:pPr lvl="1"/>
@@ -716,6 +710,7 @@
               <a:rPr lang="en-US" smtClean="0"/>
               <a:t>Second level</a:t>
             </a:r>
+            <a:endParaRPr lang="en-US" smtClean="0"/>
           </a:p>
           <a:p>
             <a:pPr lvl="2"/>
@@ -723,6 +718,7 @@
               <a:rPr lang="en-US" smtClean="0"/>
               <a:t>Third level</a:t>
             </a:r>
+            <a:endParaRPr lang="en-US" smtClean="0"/>
           </a:p>
           <a:p>
             <a:pPr lvl="3"/>
@@ -730,6 +726,7 @@
               <a:rPr lang="en-US" smtClean="0"/>
               <a:t>Fourth level</a:t>
             </a:r>
+            <a:endParaRPr lang="en-US" smtClean="0"/>
           </a:p>
           <a:p>
             <a:pPr lvl="4"/>
@@ -758,7 +755,6 @@
           <a:p>
             <a:fld id="{63A1C593-65D0-4073-BCC9-577B9352EA97}" type="datetimeFigureOut">
               <a:rPr lang="en-US" smtClean="0"/>
-              <a:t>11/27/2015</a:t>
             </a:fld>
             <a:endParaRPr lang="en-US"/>
           </a:p>
@@ -800,18 +796,12 @@
           <a:p>
             <a:fld id="{9B618960-8005-486C-9A75-10CB2AAC16F9}" type="slidenum">
               <a:rPr lang="en-US" smtClean="0"/>
-              <a:t>‹#›</a:t>
             </a:fld>
             <a:endParaRPr lang="en-US"/>
           </a:p>
         </p:txBody>
       </p:sp>
     </p:spTree>
-    <p:extLst>
-      <p:ext uri="{BB962C8B-B14F-4D97-AF65-F5344CB8AC3E}">
-        <p14:creationId xmlns:p14="http://schemas.microsoft.com/office/powerpoint/2010/main" val="140206455"/>
-      </p:ext>
-    </p:extLst>
   </p:cSld>
   <p:clrMapOvr>
     <a:masterClrMapping/>
@@ -984,6 +974,7 @@
               <a:rPr lang="en-US" smtClean="0"/>
               <a:t>Click to edit Master text styles</a:t>
             </a:r>
+            <a:endParaRPr lang="en-US" smtClean="0"/>
           </a:p>
         </p:txBody>
       </p:sp>
@@ -1004,7 +995,6 @@
           <a:p>
             <a:fld id="{63A1C593-65D0-4073-BCC9-577B9352EA97}" type="datetimeFigureOut">
               <a:rPr lang="en-US" smtClean="0"/>
-              <a:t>11/27/2015</a:t>
             </a:fld>
             <a:endParaRPr lang="en-US"/>
           </a:p>
@@ -1046,18 +1036,12 @@
           <a:p>
             <a:fld id="{9B618960-8005-486C-9A75-10CB2AAC16F9}" type="slidenum">
               <a:rPr lang="en-US" smtClean="0"/>
-              <a:t>‹#›</a:t>
             </a:fld>
             <a:endParaRPr lang="en-US"/>
           </a:p>
         </p:txBody>
       </p:sp>
     </p:spTree>
-    <p:extLst>
-      <p:ext uri="{BB962C8B-B14F-4D97-AF65-F5344CB8AC3E}">
-        <p14:creationId xmlns:p14="http://schemas.microsoft.com/office/powerpoint/2010/main" val="1965547352"/>
-      </p:ext>
-    </p:extLst>
   </p:cSld>
   <p:clrMapOvr>
     <a:masterClrMapping/>
@@ -1130,6 +1114,7 @@
               <a:rPr lang="en-US" smtClean="0"/>
               <a:t>Click to edit Master text styles</a:t>
             </a:r>
+            <a:endParaRPr lang="en-US" smtClean="0"/>
           </a:p>
           <a:p>
             <a:pPr lvl="1"/>
@@ -1137,6 +1122,7 @@
               <a:rPr lang="en-US" smtClean="0"/>
               <a:t>Second level</a:t>
             </a:r>
+            <a:endParaRPr lang="en-US" smtClean="0"/>
           </a:p>
           <a:p>
             <a:pPr lvl="2"/>
@@ -1144,6 +1130,7 @@
               <a:rPr lang="en-US" smtClean="0"/>
               <a:t>Third level</a:t>
             </a:r>
+            <a:endParaRPr lang="en-US" smtClean="0"/>
           </a:p>
           <a:p>
             <a:pPr lvl="3"/>
@@ -1151,6 +1138,7 @@
               <a:rPr lang="en-US" smtClean="0"/>
               <a:t>Fourth level</a:t>
             </a:r>
+            <a:endParaRPr lang="en-US" smtClean="0"/>
           </a:p>
           <a:p>
             <a:pPr lvl="4"/>
@@ -1187,6 +1175,7 @@
               <a:rPr lang="en-US" smtClean="0"/>
               <a:t>Click to edit Master text styles</a:t>
             </a:r>
+            <a:endParaRPr lang="en-US" smtClean="0"/>
           </a:p>
           <a:p>
             <a:pPr lvl="1"/>
@@ -1194,6 +1183,7 @@
               <a:rPr lang="en-US" smtClean="0"/>
               <a:t>Second level</a:t>
             </a:r>
+            <a:endParaRPr lang="en-US" smtClean="0"/>
           </a:p>
           <a:p>
             <a:pPr lvl="2"/>
@@ -1201,6 +1191,7 @@
               <a:rPr lang="en-US" smtClean="0"/>
               <a:t>Third level</a:t>
             </a:r>
+            <a:endParaRPr lang="en-US" smtClean="0"/>
           </a:p>
           <a:p>
             <a:pPr lvl="3"/>
@@ -1208,6 +1199,7 @@
               <a:rPr lang="en-US" smtClean="0"/>
               <a:t>Fourth level</a:t>
             </a:r>
+            <a:endParaRPr lang="en-US" smtClean="0"/>
           </a:p>
           <a:p>
             <a:pPr lvl="4"/>
@@ -1236,7 +1228,6 @@
           <a:p>
             <a:fld id="{63A1C593-65D0-4073-BCC9-577B9352EA97}" type="datetimeFigureOut">
               <a:rPr lang="en-US" smtClean="0"/>
-              <a:t>11/27/2015</a:t>
             </a:fld>
             <a:endParaRPr lang="en-US"/>
           </a:p>
@@ -1278,18 +1269,12 @@
           <a:p>
             <a:fld id="{9B618960-8005-486C-9A75-10CB2AAC16F9}" type="slidenum">
               <a:rPr lang="en-US" smtClean="0"/>
-              <a:t>‹#›</a:t>
             </a:fld>
             <a:endParaRPr lang="en-US"/>
           </a:p>
         </p:txBody>
       </p:sp>
     </p:spTree>
-    <p:extLst>
-      <p:ext uri="{BB962C8B-B14F-4D97-AF65-F5344CB8AC3E}">
-        <p14:creationId xmlns:p14="http://schemas.microsoft.com/office/powerpoint/2010/main" val="2375149612"/>
-      </p:ext>
-    </p:extLst>
   </p:cSld>
   <p:clrMapOvr>
     <a:masterClrMapping/>
@@ -1404,6 +1389,7 @@
               <a:rPr lang="en-US" smtClean="0"/>
               <a:t>Click to edit Master text styles</a:t>
             </a:r>
+            <a:endParaRPr lang="en-US" smtClean="0"/>
           </a:p>
         </p:txBody>
       </p:sp>
@@ -1432,6 +1418,7 @@
               <a:rPr lang="en-US" smtClean="0"/>
               <a:t>Click to edit Master text styles</a:t>
             </a:r>
+            <a:endParaRPr lang="en-US" smtClean="0"/>
           </a:p>
           <a:p>
             <a:pPr lvl="1"/>
@@ -1439,6 +1426,7 @@
               <a:rPr lang="en-US" smtClean="0"/>
               <a:t>Second level</a:t>
             </a:r>
+            <a:endParaRPr lang="en-US" smtClean="0"/>
           </a:p>
           <a:p>
             <a:pPr lvl="2"/>
@@ -1446,6 +1434,7 @@
               <a:rPr lang="en-US" smtClean="0"/>
               <a:t>Third level</a:t>
             </a:r>
+            <a:endParaRPr lang="en-US" smtClean="0"/>
           </a:p>
           <a:p>
             <a:pPr lvl="3"/>
@@ -1453,6 +1442,7 @@
               <a:rPr lang="en-US" smtClean="0"/>
               <a:t>Fourth level</a:t>
             </a:r>
+            <a:endParaRPr lang="en-US" smtClean="0"/>
           </a:p>
           <a:p>
             <a:pPr lvl="4"/>
@@ -1526,6 +1516,7 @@
               <a:rPr lang="en-US" smtClean="0"/>
               <a:t>Click to edit Master text styles</a:t>
             </a:r>
+            <a:endParaRPr lang="en-US" smtClean="0"/>
           </a:p>
         </p:txBody>
       </p:sp>
@@ -1554,6 +1545,7 @@
               <a:rPr lang="en-US" smtClean="0"/>
               <a:t>Click to edit Master text styles</a:t>
             </a:r>
+            <a:endParaRPr lang="en-US" smtClean="0"/>
           </a:p>
           <a:p>
             <a:pPr lvl="1"/>
@@ -1561,6 +1553,7 @@
               <a:rPr lang="en-US" smtClean="0"/>
               <a:t>Second level</a:t>
             </a:r>
+            <a:endParaRPr lang="en-US" smtClean="0"/>
           </a:p>
           <a:p>
             <a:pPr lvl="2"/>
@@ -1568,6 +1561,7 @@
               <a:rPr lang="en-US" smtClean="0"/>
               <a:t>Third level</a:t>
             </a:r>
+            <a:endParaRPr lang="en-US" smtClean="0"/>
           </a:p>
           <a:p>
             <a:pPr lvl="3"/>
@@ -1575,6 +1569,7 @@
               <a:rPr lang="en-US" smtClean="0"/>
               <a:t>Fourth level</a:t>
             </a:r>
+            <a:endParaRPr lang="en-US" smtClean="0"/>
           </a:p>
           <a:p>
             <a:pPr lvl="4"/>
@@ -1603,7 +1598,6 @@
           <a:p>
             <a:fld id="{63A1C593-65D0-4073-BCC9-577B9352EA97}" type="datetimeFigureOut">
               <a:rPr lang="en-US" smtClean="0"/>
-              <a:t>11/27/2015</a:t>
             </a:fld>
             <a:endParaRPr lang="en-US"/>
           </a:p>
@@ -1645,18 +1639,12 @@
           <a:p>
             <a:fld id="{9B618960-8005-486C-9A75-10CB2AAC16F9}" type="slidenum">
               <a:rPr lang="en-US" smtClean="0"/>
-              <a:t>‹#›</a:t>
             </a:fld>
             <a:endParaRPr lang="en-US"/>
           </a:p>
         </p:txBody>
       </p:sp>
     </p:spTree>
-    <p:extLst>
-      <p:ext uri="{BB962C8B-B14F-4D97-AF65-F5344CB8AC3E}">
-        <p14:creationId xmlns:p14="http://schemas.microsoft.com/office/powerpoint/2010/main" val="412943597"/>
-      </p:ext>
-    </p:extLst>
   </p:cSld>
   <p:clrMapOvr>
     <a:masterClrMapping/>
@@ -1721,7 +1709,6 @@
           <a:p>
             <a:fld id="{63A1C593-65D0-4073-BCC9-577B9352EA97}" type="datetimeFigureOut">
               <a:rPr lang="en-US" smtClean="0"/>
-              <a:t>11/27/2015</a:t>
             </a:fld>
             <a:endParaRPr lang="en-US"/>
           </a:p>
@@ -1763,18 +1750,12 @@
           <a:p>
             <a:fld id="{9B618960-8005-486C-9A75-10CB2AAC16F9}" type="slidenum">
               <a:rPr lang="en-US" smtClean="0"/>
-              <a:t>‹#›</a:t>
             </a:fld>
             <a:endParaRPr lang="en-US"/>
           </a:p>
         </p:txBody>
       </p:sp>
     </p:spTree>
-    <p:extLst>
-      <p:ext uri="{BB962C8B-B14F-4D97-AF65-F5344CB8AC3E}">
-        <p14:creationId xmlns:p14="http://schemas.microsoft.com/office/powerpoint/2010/main" val="3558084423"/>
-      </p:ext>
-    </p:extLst>
   </p:cSld>
   <p:clrMapOvr>
     <a:masterClrMapping/>
@@ -1816,7 +1797,6 @@
           <a:p>
             <a:fld id="{63A1C593-65D0-4073-BCC9-577B9352EA97}" type="datetimeFigureOut">
               <a:rPr lang="en-US" smtClean="0"/>
-              <a:t>11/27/2015</a:t>
             </a:fld>
             <a:endParaRPr lang="en-US"/>
           </a:p>
@@ -1858,18 +1838,12 @@
           <a:p>
             <a:fld id="{9B618960-8005-486C-9A75-10CB2AAC16F9}" type="slidenum">
               <a:rPr lang="en-US" smtClean="0"/>
-              <a:t>‹#›</a:t>
             </a:fld>
             <a:endParaRPr lang="en-US"/>
           </a:p>
         </p:txBody>
       </p:sp>
     </p:spTree>
-    <p:extLst>
-      <p:ext uri="{BB962C8B-B14F-4D97-AF65-F5344CB8AC3E}">
-        <p14:creationId xmlns:p14="http://schemas.microsoft.com/office/powerpoint/2010/main" val="2454063194"/>
-      </p:ext>
-    </p:extLst>
   </p:cSld>
   <p:clrMapOvr>
     <a:masterClrMapping/>
@@ -1979,6 +1953,7 @@
               <a:rPr lang="en-US" smtClean="0"/>
               <a:t>Click to edit Master text styles</a:t>
             </a:r>
+            <a:endParaRPr lang="en-US" smtClean="0"/>
           </a:p>
           <a:p>
             <a:pPr lvl="1"/>
@@ -1986,6 +1961,7 @@
               <a:rPr lang="en-US" smtClean="0"/>
               <a:t>Second level</a:t>
             </a:r>
+            <a:endParaRPr lang="en-US" smtClean="0"/>
           </a:p>
           <a:p>
             <a:pPr lvl="2"/>
@@ -1993,6 +1969,7 @@
               <a:rPr lang="en-US" smtClean="0"/>
               <a:t>Third level</a:t>
             </a:r>
+            <a:endParaRPr lang="en-US" smtClean="0"/>
           </a:p>
           <a:p>
             <a:pPr lvl="3"/>
@@ -2000,6 +1977,7 @@
               <a:rPr lang="en-US" smtClean="0"/>
               <a:t>Fourth level</a:t>
             </a:r>
+            <a:endParaRPr lang="en-US" smtClean="0"/>
           </a:p>
           <a:p>
             <a:pPr lvl="4"/>
@@ -2073,6 +2051,7 @@
               <a:rPr lang="en-US" smtClean="0"/>
               <a:t>Click to edit Master text styles</a:t>
             </a:r>
+            <a:endParaRPr lang="en-US" smtClean="0"/>
           </a:p>
         </p:txBody>
       </p:sp>
@@ -2093,7 +2072,6 @@
           <a:p>
             <a:fld id="{63A1C593-65D0-4073-BCC9-577B9352EA97}" type="datetimeFigureOut">
               <a:rPr lang="en-US" smtClean="0"/>
-              <a:t>11/27/2015</a:t>
             </a:fld>
             <a:endParaRPr lang="en-US"/>
           </a:p>
@@ -2135,18 +2113,12 @@
           <a:p>
             <a:fld id="{9B618960-8005-486C-9A75-10CB2AAC16F9}" type="slidenum">
               <a:rPr lang="en-US" smtClean="0"/>
-              <a:t>‹#›</a:t>
             </a:fld>
             <a:endParaRPr lang="en-US"/>
           </a:p>
         </p:txBody>
       </p:sp>
     </p:spTree>
-    <p:extLst>
-      <p:ext uri="{BB962C8B-B14F-4D97-AF65-F5344CB8AC3E}">
-        <p14:creationId xmlns:p14="http://schemas.microsoft.com/office/powerpoint/2010/main" val="3300537932"/>
-      </p:ext>
-    </p:extLst>
   </p:cSld>
   <p:clrMapOvr>
     <a:masterClrMapping/>
@@ -2326,6 +2298,7 @@
               <a:rPr lang="en-US" smtClean="0"/>
               <a:t>Click to edit Master text styles</a:t>
             </a:r>
+            <a:endParaRPr lang="en-US" smtClean="0"/>
           </a:p>
         </p:txBody>
       </p:sp>
@@ -2346,7 +2319,6 @@
           <a:p>
             <a:fld id="{63A1C593-65D0-4073-BCC9-577B9352EA97}" type="datetimeFigureOut">
               <a:rPr lang="en-US" smtClean="0"/>
-              <a:t>11/27/2015</a:t>
             </a:fld>
             <a:endParaRPr lang="en-US"/>
           </a:p>
@@ -2388,18 +2360,12 @@
           <a:p>
             <a:fld id="{9B618960-8005-486C-9A75-10CB2AAC16F9}" type="slidenum">
               <a:rPr lang="en-US" smtClean="0"/>
-              <a:t>‹#›</a:t>
             </a:fld>
             <a:endParaRPr lang="en-US"/>
           </a:p>
         </p:txBody>
       </p:sp>
     </p:spTree>
-    <p:extLst>
-      <p:ext uri="{BB962C8B-B14F-4D97-AF65-F5344CB8AC3E}">
-        <p14:creationId xmlns:p14="http://schemas.microsoft.com/office/powerpoint/2010/main" val="585876398"/>
-      </p:ext>
-    </p:extLst>
   </p:cSld>
   <p:clrMapOvr>
     <a:masterClrMapping/>
@@ -2492,6 +2458,7 @@
               <a:rPr lang="en-US" smtClean="0"/>
               <a:t>Click to edit Master text styles</a:t>
             </a:r>
+            <a:endParaRPr lang="en-US" smtClean="0"/>
           </a:p>
           <a:p>
             <a:pPr lvl="1"/>
@@ -2499,6 +2466,7 @@
               <a:rPr lang="en-US" smtClean="0"/>
               <a:t>Second level</a:t>
             </a:r>
+            <a:endParaRPr lang="en-US" smtClean="0"/>
           </a:p>
           <a:p>
             <a:pPr lvl="2"/>
@@ -2506,6 +2474,7 @@
               <a:rPr lang="en-US" smtClean="0"/>
               <a:t>Third level</a:t>
             </a:r>
+            <a:endParaRPr lang="en-US" smtClean="0"/>
           </a:p>
           <a:p>
             <a:pPr lvl="3"/>
@@ -2513,6 +2482,7 @@
               <a:rPr lang="en-US" smtClean="0"/>
               <a:t>Fourth level</a:t>
             </a:r>
+            <a:endParaRPr lang="en-US" smtClean="0"/>
           </a:p>
           <a:p>
             <a:pPr lvl="4"/>
@@ -2559,7 +2529,6 @@
           <a:p>
             <a:fld id="{63A1C593-65D0-4073-BCC9-577B9352EA97}" type="datetimeFigureOut">
               <a:rPr lang="en-US" smtClean="0"/>
-              <a:t>11/27/2015</a:t>
             </a:fld>
             <a:endParaRPr lang="en-US"/>
           </a:p>
@@ -2637,18 +2606,12 @@
           <a:p>
             <a:fld id="{9B618960-8005-486C-9A75-10CB2AAC16F9}" type="slidenum">
               <a:rPr lang="en-US" smtClean="0"/>
-              <a:t>‹#›</a:t>
             </a:fld>
             <a:endParaRPr lang="en-US"/>
           </a:p>
         </p:txBody>
       </p:sp>
     </p:spTree>
-    <p:extLst>
-      <p:ext uri="{BB962C8B-B14F-4D97-AF65-F5344CB8AC3E}">
-        <p14:creationId xmlns:p14="http://schemas.microsoft.com/office/powerpoint/2010/main" val="3597300896"/>
-      </p:ext>
-    </p:extLst>
   </p:cSld>
   <p:clrMap bg1="lt1" tx1="dk1" bg2="lt2" tx2="dk2" accent1="accent1" accent2="accent2" accent3="accent3" accent4="accent4" accent5="accent5" accent6="accent6" hlink="hlink" folHlink="folHlink"/>
   <p:sldLayoutIdLst>
@@ -2950,6 +2913,17 @@
 <file path=ppt/slides/slide1.xml><?xml version="1.0" encoding="utf-8"?>
 <p:sld xmlns:a="http://schemas.openxmlformats.org/drawingml/2006/main" xmlns:r="http://schemas.openxmlformats.org/officeDocument/2006/relationships" xmlns:p="http://schemas.openxmlformats.org/presentationml/2006/main">
   <p:cSld>
+    <p:bg>
+      <p:bgPr>
+        <a:solidFill>
+          <a:schemeClr val="bg1">
+            <a:lumMod val="85000"/>
+            <a:alpha val="40000"/>
+          </a:schemeClr>
+        </a:solidFill>
+        <a:effectLst/>
+      </p:bgPr>
+    </p:bg>
     <p:spTree>
       <p:nvGrpSpPr>
         <p:cNvPr id="1" name=""/>
@@ -2966,53 +2940,1815 @@
       </p:grpSpPr>
       <p:sp>
         <p:nvSpPr>
-          <p:cNvPr id="2" name="Title 1"/>
-          <p:cNvSpPr>
-            <a:spLocks noGrp="1"/>
-          </p:cNvSpPr>
-          <p:nvPr>
-            <p:ph type="ctrTitle"/>
-          </p:nvPr>
-        </p:nvSpPr>
-        <p:spPr/>
-        <p:txBody>
-          <a:bodyPr/>
+          <p:cNvPr id="4" name="Rectangles 3"/>
+          <p:cNvSpPr/>
+          <p:nvPr/>
+        </p:nvSpPr>
+        <p:spPr>
+          <a:xfrm>
+            <a:off x="584200" y="463550"/>
+            <a:ext cx="11132185" cy="5862320"/>
+          </a:xfrm>
+          <a:prstGeom prst="rect">
+            <a:avLst/>
+          </a:prstGeom>
+          <a:solidFill>
+            <a:schemeClr val="bg1"/>
+          </a:solidFill>
+          <a:ln>
+            <a:noFill/>
+          </a:ln>
+          <a:effectLst>
+            <a:outerShdw blurRad="50800" dist="38100" dir="8100000" algn="tr" rotWithShape="0">
+              <a:prstClr val="black">
+                <a:alpha val="25000"/>
+              </a:prstClr>
+            </a:outerShdw>
+          </a:effectLst>
+        </p:spPr>
+        <p:style>
+          <a:lnRef idx="2">
+            <a:schemeClr val="accent1">
+              <a:lumMod val="75000"/>
+            </a:schemeClr>
+          </a:lnRef>
+          <a:fillRef idx="1">
+            <a:schemeClr val="accent1"/>
+          </a:fillRef>
+          <a:effectRef idx="0">
+            <a:srgbClr val="FFFFFF"/>
+          </a:effectRef>
+          <a:fontRef idx="minor">
+            <a:schemeClr val="lt1"/>
+          </a:fontRef>
+        </p:style>
+        <p:txBody>
+          <a:bodyPr rtlCol="0" anchor="ctr"/>
+          <a:p>
+            <a:pPr algn="ctr"/>
+            <a:endParaRPr lang="en-GB" altLang="en-US"/>
+          </a:p>
+        </p:txBody>
+      </p:sp>
+      <p:cxnSp>
+        <p:nvCxnSpPr>
+          <p:cNvPr id="5" name="Straight Connector 4"/>
+          <p:cNvCxnSpPr/>
+          <p:nvPr/>
+        </p:nvCxnSpPr>
+        <p:spPr>
+          <a:xfrm>
+            <a:off x="584200" y="5459095"/>
+            <a:ext cx="2842260" cy="2540"/>
+          </a:xfrm>
+          <a:prstGeom prst="line">
+            <a:avLst/>
+          </a:prstGeom>
+        </p:spPr>
+        <p:style>
+          <a:lnRef idx="3">
+            <a:prstClr val="black"/>
+          </a:lnRef>
+          <a:fillRef idx="0">
+            <a:srgbClr val="FFFFFF"/>
+          </a:fillRef>
+          <a:effectRef idx="0">
+            <a:srgbClr val="FFFFFF"/>
+          </a:effectRef>
+          <a:fontRef idx="minor">
+            <a:schemeClr val="tx1"/>
+          </a:fontRef>
+        </p:style>
+      </p:cxnSp>
+      <p:sp>
+        <p:nvSpPr>
+          <p:cNvPr id="6" name="Text Box 5"/>
+          <p:cNvSpPr txBox="1"/>
+          <p:nvPr/>
+        </p:nvSpPr>
+        <p:spPr>
+          <a:xfrm>
+            <a:off x="984250" y="1050290"/>
+            <a:ext cx="6144260" cy="706755"/>
+          </a:xfrm>
+          <a:prstGeom prst="rect">
+            <a:avLst/>
+          </a:prstGeom>
+          <a:noFill/>
+        </p:spPr>
+        <p:txBody>
+          <a:bodyPr wrap="square" rtlCol="0">
+            <a:spAutoFit/>
+          </a:bodyPr>
+          <a:p>
+            <a:r>
+              <a:rPr lang="en-US" altLang="en-GB" sz="2000" b="1">
+                <a:effectLst/>
+              </a:rPr>
+              <a:t>Performance Comparison of QUIC and TCL+TLS Protocols</a:t>
+            </a:r>
+            <a:endParaRPr lang="en-US" altLang="en-GB" sz="2000" b="1">
+              <a:effectLst/>
+            </a:endParaRPr>
+          </a:p>
+          <a:p>
+            <a:r>
+              <a:rPr lang="en-US" altLang="en-GB" sz="2000" b="1">
+                <a:effectLst/>
+              </a:rPr>
+              <a:t>in a File Transfer Application</a:t>
+            </a:r>
+            <a:endParaRPr lang="en-US" altLang="en-GB" sz="2000" b="1">
+              <a:effectLst/>
+            </a:endParaRPr>
+          </a:p>
+        </p:txBody>
+      </p:sp>
+      <p:sp>
+        <p:nvSpPr>
+          <p:cNvPr id="7" name="Text Box 6"/>
+          <p:cNvSpPr txBox="1"/>
+          <p:nvPr/>
+        </p:nvSpPr>
+        <p:spPr>
+          <a:xfrm>
+            <a:off x="735965" y="5642610"/>
+            <a:ext cx="3103880" cy="306705"/>
+          </a:xfrm>
+          <a:prstGeom prst="rect">
+            <a:avLst/>
+          </a:prstGeom>
+          <a:noFill/>
+        </p:spPr>
+        <p:txBody>
+          <a:bodyPr wrap="square" rtlCol="0">
+            <a:spAutoFit/>
+          </a:bodyPr>
+          <a:p>
+            <a:r>
+              <a:rPr lang="it-IT" altLang="en-GB" sz="1400"/>
+              <a:t>Riccardo Puddu, Simone Zedda</a:t>
+            </a:r>
+            <a:endParaRPr lang="it-IT" altLang="en-GB" sz="1400"/>
+          </a:p>
+        </p:txBody>
+      </p:sp>
+      <p:sp>
+        <p:nvSpPr>
+          <p:cNvPr id="68" name="椭圆 4"/>
+          <p:cNvSpPr/>
+          <p:nvPr>
+            <p:custDataLst>
+              <p:tags r:id="rId1"/>
+            </p:custDataLst>
+          </p:nvPr>
+        </p:nvSpPr>
+        <p:spPr>
+          <a:xfrm>
+            <a:off x="7362825" y="2661920"/>
+            <a:ext cx="2247900" cy="2247900"/>
+          </a:xfrm>
+          <a:prstGeom prst="ellipse">
+            <a:avLst/>
+          </a:prstGeom>
+          <a:solidFill>
+            <a:schemeClr val="accent1">
+              <a:lumMod val="20000"/>
+              <a:lumOff val="80000"/>
+              <a:alpha val="60000"/>
+            </a:schemeClr>
+          </a:solidFill>
+          <a:ln>
+            <a:noFill/>
+          </a:ln>
+          <a:effectLst/>
+        </p:spPr>
+        <p:style>
+          <a:lnRef idx="2">
+            <a:schemeClr val="accent1">
+              <a:shade val="50000"/>
+            </a:schemeClr>
+          </a:lnRef>
+          <a:fillRef idx="1">
+            <a:schemeClr val="accent1"/>
+          </a:fillRef>
+          <a:effectRef idx="0">
+            <a:schemeClr val="accent1"/>
+          </a:effectRef>
+          <a:fontRef idx="minor">
+            <a:schemeClr val="lt1"/>
+          </a:fontRef>
+        </p:style>
+        <p:txBody>
+          <a:bodyPr vertOverflow="overflow" horzOverflow="overflow" vert="horz" wrap="square" numCol="1" spcCol="0" rtlCol="0" fromWordArt="0" anchor="ctr" anchorCtr="0" forceAA="0" compatLnSpc="1">
+            <a:noAutofit/>
+          </a:bodyPr>
           <a:lstStyle/>
           <a:p>
-            <a:endParaRPr lang="en-US" dirty="0"/>
-          </a:p>
-        </p:txBody>
-      </p:sp>
-      <p:sp>
-        <p:nvSpPr>
-          <p:cNvPr id="3" name="Subtitle 2"/>
-          <p:cNvSpPr>
-            <a:spLocks noGrp="1"/>
-          </p:cNvSpPr>
-          <p:nvPr>
-            <p:ph type="subTitle" idx="1"/>
-          </p:nvPr>
-        </p:nvSpPr>
-        <p:spPr/>
-        <p:txBody>
-          <a:bodyPr/>
+            <a:pPr lvl="0" algn="ctr">
+              <a:buClrTx/>
+              <a:buSzTx/>
+              <a:buFontTx/>
+            </a:pPr>
+            <a:endParaRPr lang="en-US">
+              <a:sym typeface="+mn-lt"/>
+            </a:endParaRPr>
+          </a:p>
+        </p:txBody>
+      </p:sp>
+      <p:sp>
+        <p:nvSpPr>
+          <p:cNvPr id="73" name="弧形 13"/>
+          <p:cNvSpPr/>
+          <p:nvPr>
+            <p:custDataLst>
+              <p:tags r:id="rId2"/>
+            </p:custDataLst>
+          </p:nvPr>
+        </p:nvSpPr>
+        <p:spPr>
+          <a:xfrm rot="7200000">
+            <a:off x="7102475" y="2401570"/>
+            <a:ext cx="2769235" cy="2769235"/>
+          </a:xfrm>
+          <a:prstGeom prst="arc">
+            <a:avLst>
+              <a:gd name="adj1" fmla="val 15835561"/>
+              <a:gd name="adj2" fmla="val 21121678"/>
+            </a:avLst>
+          </a:prstGeom>
+          <a:ln w="6350">
+            <a:gradFill>
+              <a:gsLst>
+                <a:gs pos="0">
+                  <a:schemeClr val="accent1">
+                    <a:alpha val="0"/>
+                  </a:schemeClr>
+                </a:gs>
+                <a:gs pos="60000">
+                  <a:schemeClr val="accent1"/>
+                </a:gs>
+              </a:gsLst>
+              <a:lin ang="5400000" scaled="1"/>
+            </a:gradFill>
+            <a:prstDash val="dash"/>
+            <a:tailEnd type="triangle"/>
+          </a:ln>
+          <a:effectLst>
+            <a:outerShdw blurRad="50800" dist="38100" dir="2700000" algn="tl" rotWithShape="0">
+              <a:schemeClr val="accent1">
+                <a:lumMod val="75000"/>
+                <a:alpha val="40000"/>
+              </a:schemeClr>
+            </a:outerShdw>
+          </a:effectLst>
+        </p:spPr>
+        <p:style>
+          <a:lnRef idx="1">
+            <a:schemeClr val="accent1"/>
+          </a:lnRef>
+          <a:fillRef idx="0">
+            <a:schemeClr val="accent1"/>
+          </a:fillRef>
+          <a:effectRef idx="0">
+            <a:schemeClr val="accent1"/>
+          </a:effectRef>
+          <a:fontRef idx="minor">
+            <a:schemeClr val="tx1"/>
+          </a:fontRef>
+        </p:style>
+        <p:txBody>
+          <a:bodyPr rtlCol="0" anchor="ctr"/>
+          <a:lstStyle>
+            <a:defPPr>
+              <a:defRPr lang="en-US"/>
+            </a:defPPr>
+            <a:lvl1pPr marL="0" algn="l" defTabSz="914400" rtl="0" eaLnBrk="1" latinLnBrk="0" hangingPunct="1">
+              <a:defRPr sz="1800" kern="1200">
+                <a:solidFill>
+                  <a:schemeClr val="tx1"/>
+                </a:solidFill>
+                <a:latin typeface="+mn-lt"/>
+              </a:defRPr>
+            </a:lvl1pPr>
+            <a:lvl2pPr marL="457200" algn="l" defTabSz="914400" rtl="0" eaLnBrk="1" latinLnBrk="0" hangingPunct="1">
+              <a:defRPr sz="1800" kern="1200">
+                <a:solidFill>
+                  <a:schemeClr val="tx1"/>
+                </a:solidFill>
+                <a:latin typeface="+mn-lt"/>
+              </a:defRPr>
+            </a:lvl2pPr>
+            <a:lvl3pPr marL="914400" algn="l" defTabSz="914400" rtl="0" eaLnBrk="1" latinLnBrk="0" hangingPunct="1">
+              <a:defRPr sz="1800" kern="1200">
+                <a:solidFill>
+                  <a:schemeClr val="tx1"/>
+                </a:solidFill>
+                <a:latin typeface="+mn-lt"/>
+              </a:defRPr>
+            </a:lvl3pPr>
+            <a:lvl4pPr marL="1371600" algn="l" defTabSz="914400" rtl="0" eaLnBrk="1" latinLnBrk="0" hangingPunct="1">
+              <a:defRPr sz="1800" kern="1200">
+                <a:solidFill>
+                  <a:schemeClr val="tx1"/>
+                </a:solidFill>
+                <a:latin typeface="+mn-lt"/>
+              </a:defRPr>
+            </a:lvl4pPr>
+            <a:lvl5pPr marL="1828800" algn="l" defTabSz="914400" rtl="0" eaLnBrk="1" latinLnBrk="0" hangingPunct="1">
+              <a:defRPr sz="1800" kern="1200">
+                <a:solidFill>
+                  <a:schemeClr val="tx1"/>
+                </a:solidFill>
+                <a:latin typeface="+mn-lt"/>
+              </a:defRPr>
+            </a:lvl5pPr>
+            <a:lvl6pPr marL="2286000" algn="l" defTabSz="914400" rtl="0" eaLnBrk="1" latinLnBrk="0" hangingPunct="1">
+              <a:defRPr sz="1800" kern="1200">
+                <a:solidFill>
+                  <a:schemeClr val="tx1"/>
+                </a:solidFill>
+                <a:latin typeface="+mn-lt"/>
+              </a:defRPr>
+            </a:lvl6pPr>
+            <a:lvl7pPr marL="2743200" algn="l" defTabSz="914400" rtl="0" eaLnBrk="1" latinLnBrk="0" hangingPunct="1">
+              <a:defRPr sz="1800" kern="1200">
+                <a:solidFill>
+                  <a:schemeClr val="tx1"/>
+                </a:solidFill>
+                <a:latin typeface="+mn-lt"/>
+              </a:defRPr>
+            </a:lvl7pPr>
+            <a:lvl8pPr marL="3200400" algn="l" defTabSz="914400" rtl="0" eaLnBrk="1" latinLnBrk="0" hangingPunct="1">
+              <a:defRPr sz="1800" kern="1200">
+                <a:solidFill>
+                  <a:schemeClr val="tx1"/>
+                </a:solidFill>
+                <a:latin typeface="+mn-lt"/>
+              </a:defRPr>
+            </a:lvl8pPr>
+            <a:lvl9pPr marL="3657600" algn="l" defTabSz="914400" rtl="0" eaLnBrk="1" latinLnBrk="0" hangingPunct="1">
+              <a:defRPr sz="1800" kern="1200">
+                <a:solidFill>
+                  <a:schemeClr val="tx1"/>
+                </a:solidFill>
+                <a:latin typeface="+mn-lt"/>
+              </a:defRPr>
+            </a:lvl9pPr>
+          </a:lstStyle>
+          <a:p>
+            <a:pPr algn="ctr"/>
+            <a:endParaRPr lang="en-US"/>
+          </a:p>
+        </p:txBody>
+      </p:sp>
+      <p:sp>
+        <p:nvSpPr>
+          <p:cNvPr id="74" name="弧形 14"/>
+          <p:cNvSpPr/>
+          <p:nvPr>
+            <p:custDataLst>
+              <p:tags r:id="rId3"/>
+            </p:custDataLst>
+          </p:nvPr>
+        </p:nvSpPr>
+        <p:spPr>
+          <a:xfrm rot="20880000">
+            <a:off x="7115810" y="2402205"/>
+            <a:ext cx="2769235" cy="2769235"/>
+          </a:xfrm>
+          <a:prstGeom prst="arc">
+            <a:avLst>
+              <a:gd name="adj1" fmla="val 15835561"/>
+              <a:gd name="adj2" fmla="val 21121678"/>
+            </a:avLst>
+          </a:prstGeom>
+          <a:ln w="6350">
+            <a:gradFill>
+              <a:gsLst>
+                <a:gs pos="0">
+                  <a:schemeClr val="accent1">
+                    <a:alpha val="0"/>
+                  </a:schemeClr>
+                </a:gs>
+                <a:gs pos="60000">
+                  <a:schemeClr val="accent1"/>
+                </a:gs>
+              </a:gsLst>
+              <a:lin ang="5400000" scaled="1"/>
+            </a:gradFill>
+            <a:prstDash val="dash"/>
+            <a:tailEnd type="triangle"/>
+          </a:ln>
+          <a:effectLst>
+            <a:outerShdw blurRad="50800" dist="38100" dir="2700000" algn="tl" rotWithShape="0">
+              <a:schemeClr val="accent1">
+                <a:lumMod val="75000"/>
+                <a:alpha val="40000"/>
+              </a:schemeClr>
+            </a:outerShdw>
+          </a:effectLst>
+        </p:spPr>
+        <p:style>
+          <a:lnRef idx="1">
+            <a:schemeClr val="accent1"/>
+          </a:lnRef>
+          <a:fillRef idx="0">
+            <a:schemeClr val="accent1"/>
+          </a:fillRef>
+          <a:effectRef idx="0">
+            <a:schemeClr val="accent1"/>
+          </a:effectRef>
+          <a:fontRef idx="minor">
+            <a:schemeClr val="tx1"/>
+          </a:fontRef>
+        </p:style>
+        <p:txBody>
+          <a:bodyPr rtlCol="0" anchor="ctr"/>
+          <a:lstStyle>
+            <a:defPPr>
+              <a:defRPr lang="en-US"/>
+            </a:defPPr>
+            <a:lvl1pPr marL="0" algn="l" defTabSz="914400" rtl="0" eaLnBrk="1" latinLnBrk="0" hangingPunct="1">
+              <a:defRPr sz="1800" kern="1200">
+                <a:solidFill>
+                  <a:schemeClr val="tx1"/>
+                </a:solidFill>
+                <a:latin typeface="+mn-lt"/>
+              </a:defRPr>
+            </a:lvl1pPr>
+            <a:lvl2pPr marL="457200" algn="l" defTabSz="914400" rtl="0" eaLnBrk="1" latinLnBrk="0" hangingPunct="1">
+              <a:defRPr sz="1800" kern="1200">
+                <a:solidFill>
+                  <a:schemeClr val="tx1"/>
+                </a:solidFill>
+                <a:latin typeface="+mn-lt"/>
+              </a:defRPr>
+            </a:lvl2pPr>
+            <a:lvl3pPr marL="914400" algn="l" defTabSz="914400" rtl="0" eaLnBrk="1" latinLnBrk="0" hangingPunct="1">
+              <a:defRPr sz="1800" kern="1200">
+                <a:solidFill>
+                  <a:schemeClr val="tx1"/>
+                </a:solidFill>
+                <a:latin typeface="+mn-lt"/>
+              </a:defRPr>
+            </a:lvl3pPr>
+            <a:lvl4pPr marL="1371600" algn="l" defTabSz="914400" rtl="0" eaLnBrk="1" latinLnBrk="0" hangingPunct="1">
+              <a:defRPr sz="1800" kern="1200">
+                <a:solidFill>
+                  <a:schemeClr val="tx1"/>
+                </a:solidFill>
+                <a:latin typeface="+mn-lt"/>
+              </a:defRPr>
+            </a:lvl4pPr>
+            <a:lvl5pPr marL="1828800" algn="l" defTabSz="914400" rtl="0" eaLnBrk="1" latinLnBrk="0" hangingPunct="1">
+              <a:defRPr sz="1800" kern="1200">
+                <a:solidFill>
+                  <a:schemeClr val="tx1"/>
+                </a:solidFill>
+                <a:latin typeface="+mn-lt"/>
+              </a:defRPr>
+            </a:lvl5pPr>
+            <a:lvl6pPr marL="2286000" algn="l" defTabSz="914400" rtl="0" eaLnBrk="1" latinLnBrk="0" hangingPunct="1">
+              <a:defRPr sz="1800" kern="1200">
+                <a:solidFill>
+                  <a:schemeClr val="tx1"/>
+                </a:solidFill>
+                <a:latin typeface="+mn-lt"/>
+              </a:defRPr>
+            </a:lvl6pPr>
+            <a:lvl7pPr marL="2743200" algn="l" defTabSz="914400" rtl="0" eaLnBrk="1" latinLnBrk="0" hangingPunct="1">
+              <a:defRPr sz="1800" kern="1200">
+                <a:solidFill>
+                  <a:schemeClr val="tx1"/>
+                </a:solidFill>
+                <a:latin typeface="+mn-lt"/>
+              </a:defRPr>
+            </a:lvl7pPr>
+            <a:lvl8pPr marL="3200400" algn="l" defTabSz="914400" rtl="0" eaLnBrk="1" latinLnBrk="0" hangingPunct="1">
+              <a:defRPr sz="1800" kern="1200">
+                <a:solidFill>
+                  <a:schemeClr val="tx1"/>
+                </a:solidFill>
+                <a:latin typeface="+mn-lt"/>
+              </a:defRPr>
+            </a:lvl8pPr>
+            <a:lvl9pPr marL="3657600" algn="l" defTabSz="914400" rtl="0" eaLnBrk="1" latinLnBrk="0" hangingPunct="1">
+              <a:defRPr sz="1800" kern="1200">
+                <a:solidFill>
+                  <a:schemeClr val="tx1"/>
+                </a:solidFill>
+                <a:latin typeface="+mn-lt"/>
+              </a:defRPr>
+            </a:lvl9pPr>
+          </a:lstStyle>
+          <a:p>
+            <a:pPr algn="ctr"/>
+            <a:endParaRPr lang="en-US"/>
+          </a:p>
+        </p:txBody>
+      </p:sp>
+      <p:sp>
+        <p:nvSpPr>
+          <p:cNvPr id="67" name="椭圆 2"/>
+          <p:cNvSpPr/>
+          <p:nvPr>
+            <p:custDataLst>
+              <p:tags r:id="rId4"/>
+            </p:custDataLst>
+          </p:nvPr>
+        </p:nvSpPr>
+        <p:spPr>
+          <a:xfrm>
+            <a:off x="6323330" y="1622425"/>
+            <a:ext cx="4326890" cy="4326890"/>
+          </a:xfrm>
+          <a:prstGeom prst="ellipse">
+            <a:avLst/>
+          </a:prstGeom>
+          <a:gradFill>
+            <a:gsLst>
+              <a:gs pos="0">
+                <a:schemeClr val="accent1">
+                  <a:lumMod val="20000"/>
+                  <a:lumOff val="80000"/>
+                  <a:alpha val="0"/>
+                </a:schemeClr>
+              </a:gs>
+              <a:gs pos="100000">
+                <a:schemeClr val="accent1">
+                  <a:lumMod val="20000"/>
+                  <a:lumOff val="80000"/>
+                  <a:alpha val="51000"/>
+                </a:schemeClr>
+              </a:gs>
+            </a:gsLst>
+            <a:lin ang="16200000" scaled="0"/>
+          </a:gradFill>
+          <a:ln>
+            <a:noFill/>
+          </a:ln>
+          <a:effectLst/>
+        </p:spPr>
+        <p:style>
+          <a:lnRef idx="2">
+            <a:schemeClr val="accent1">
+              <a:shade val="50000"/>
+            </a:schemeClr>
+          </a:lnRef>
+          <a:fillRef idx="1">
+            <a:schemeClr val="accent1"/>
+          </a:fillRef>
+          <a:effectRef idx="0">
+            <a:schemeClr val="accent1"/>
+          </a:effectRef>
+          <a:fontRef idx="minor">
+            <a:schemeClr val="lt1"/>
+          </a:fontRef>
+        </p:style>
+        <p:txBody>
+          <a:bodyPr vertOverflow="overflow" horzOverflow="overflow" vert="horz" wrap="square" numCol="1" spcCol="0" rtlCol="0" fromWordArt="0" anchor="ctr" anchorCtr="0" forceAA="0" compatLnSpc="1">
+            <a:noAutofit/>
+          </a:bodyPr>
           <a:lstStyle/>
           <a:p>
-            <a:endParaRPr lang="en-US"/>
-          </a:p>
-        </p:txBody>
-      </p:sp>
+            <a:pPr lvl="0" algn="ctr">
+              <a:buClrTx/>
+              <a:buSzTx/>
+              <a:buFontTx/>
+            </a:pPr>
+            <a:endParaRPr lang="en-US">
+              <a:sym typeface="+mn-lt"/>
+            </a:endParaRPr>
+          </a:p>
+        </p:txBody>
+      </p:sp>
+      <p:sp>
+        <p:nvSpPr>
+          <p:cNvPr id="75" name="弧形 15"/>
+          <p:cNvSpPr/>
+          <p:nvPr>
+            <p:custDataLst>
+              <p:tags r:id="rId5"/>
+            </p:custDataLst>
+          </p:nvPr>
+        </p:nvSpPr>
+        <p:spPr>
+          <a:xfrm rot="14100000">
+            <a:off x="7115810" y="2402205"/>
+            <a:ext cx="2769235" cy="2769235"/>
+          </a:xfrm>
+          <a:prstGeom prst="arc">
+            <a:avLst>
+              <a:gd name="adj1" fmla="val 15835561"/>
+              <a:gd name="adj2" fmla="val 21121678"/>
+            </a:avLst>
+          </a:prstGeom>
+          <a:ln w="6350">
+            <a:gradFill>
+              <a:gsLst>
+                <a:gs pos="0">
+                  <a:schemeClr val="accent1">
+                    <a:alpha val="0"/>
+                  </a:schemeClr>
+                </a:gs>
+                <a:gs pos="60000">
+                  <a:schemeClr val="accent1"/>
+                </a:gs>
+              </a:gsLst>
+              <a:lin ang="5400000" scaled="1"/>
+            </a:gradFill>
+            <a:prstDash val="dash"/>
+            <a:tailEnd type="triangle"/>
+          </a:ln>
+          <a:effectLst>
+            <a:outerShdw blurRad="50800" dist="38100" dir="2700000" algn="tl" rotWithShape="0">
+              <a:schemeClr val="accent1">
+                <a:lumMod val="75000"/>
+                <a:alpha val="40000"/>
+              </a:schemeClr>
+            </a:outerShdw>
+          </a:effectLst>
+        </p:spPr>
+        <p:style>
+          <a:lnRef idx="1">
+            <a:schemeClr val="accent1"/>
+          </a:lnRef>
+          <a:fillRef idx="0">
+            <a:schemeClr val="accent1"/>
+          </a:fillRef>
+          <a:effectRef idx="0">
+            <a:schemeClr val="accent1"/>
+          </a:effectRef>
+          <a:fontRef idx="minor">
+            <a:schemeClr val="tx1"/>
+          </a:fontRef>
+        </p:style>
+        <p:txBody>
+          <a:bodyPr rtlCol="0" anchor="ctr"/>
+          <a:lstStyle>
+            <a:defPPr>
+              <a:defRPr lang="en-US"/>
+            </a:defPPr>
+            <a:lvl1pPr marL="0" algn="l" defTabSz="914400" rtl="0" eaLnBrk="1" latinLnBrk="0" hangingPunct="1">
+              <a:defRPr sz="1800" kern="1200">
+                <a:solidFill>
+                  <a:schemeClr val="tx1"/>
+                </a:solidFill>
+                <a:latin typeface="+mn-lt"/>
+              </a:defRPr>
+            </a:lvl1pPr>
+            <a:lvl2pPr marL="457200" algn="l" defTabSz="914400" rtl="0" eaLnBrk="1" latinLnBrk="0" hangingPunct="1">
+              <a:defRPr sz="1800" kern="1200">
+                <a:solidFill>
+                  <a:schemeClr val="tx1"/>
+                </a:solidFill>
+                <a:latin typeface="+mn-lt"/>
+              </a:defRPr>
+            </a:lvl2pPr>
+            <a:lvl3pPr marL="914400" algn="l" defTabSz="914400" rtl="0" eaLnBrk="1" latinLnBrk="0" hangingPunct="1">
+              <a:defRPr sz="1800" kern="1200">
+                <a:solidFill>
+                  <a:schemeClr val="tx1"/>
+                </a:solidFill>
+                <a:latin typeface="+mn-lt"/>
+              </a:defRPr>
+            </a:lvl3pPr>
+            <a:lvl4pPr marL="1371600" algn="l" defTabSz="914400" rtl="0" eaLnBrk="1" latinLnBrk="0" hangingPunct="1">
+              <a:defRPr sz="1800" kern="1200">
+                <a:solidFill>
+                  <a:schemeClr val="tx1"/>
+                </a:solidFill>
+                <a:latin typeface="+mn-lt"/>
+              </a:defRPr>
+            </a:lvl4pPr>
+            <a:lvl5pPr marL="1828800" algn="l" defTabSz="914400" rtl="0" eaLnBrk="1" latinLnBrk="0" hangingPunct="1">
+              <a:defRPr sz="1800" kern="1200">
+                <a:solidFill>
+                  <a:schemeClr val="tx1"/>
+                </a:solidFill>
+                <a:latin typeface="+mn-lt"/>
+              </a:defRPr>
+            </a:lvl5pPr>
+            <a:lvl6pPr marL="2286000" algn="l" defTabSz="914400" rtl="0" eaLnBrk="1" latinLnBrk="0" hangingPunct="1">
+              <a:defRPr sz="1800" kern="1200">
+                <a:solidFill>
+                  <a:schemeClr val="tx1"/>
+                </a:solidFill>
+                <a:latin typeface="+mn-lt"/>
+              </a:defRPr>
+            </a:lvl6pPr>
+            <a:lvl7pPr marL="2743200" algn="l" defTabSz="914400" rtl="0" eaLnBrk="1" latinLnBrk="0" hangingPunct="1">
+              <a:defRPr sz="1800" kern="1200">
+                <a:solidFill>
+                  <a:schemeClr val="tx1"/>
+                </a:solidFill>
+                <a:latin typeface="+mn-lt"/>
+              </a:defRPr>
+            </a:lvl7pPr>
+            <a:lvl8pPr marL="3200400" algn="l" defTabSz="914400" rtl="0" eaLnBrk="1" latinLnBrk="0" hangingPunct="1">
+              <a:defRPr sz="1800" kern="1200">
+                <a:solidFill>
+                  <a:schemeClr val="tx1"/>
+                </a:solidFill>
+                <a:latin typeface="+mn-lt"/>
+              </a:defRPr>
+            </a:lvl8pPr>
+            <a:lvl9pPr marL="3657600" algn="l" defTabSz="914400" rtl="0" eaLnBrk="1" latinLnBrk="0" hangingPunct="1">
+              <a:defRPr sz="1800" kern="1200">
+                <a:solidFill>
+                  <a:schemeClr val="tx1"/>
+                </a:solidFill>
+                <a:latin typeface="+mn-lt"/>
+              </a:defRPr>
+            </a:lvl9pPr>
+          </a:lstStyle>
+          <a:p>
+            <a:pPr algn="ctr"/>
+            <a:endParaRPr lang="en-US"/>
+          </a:p>
+        </p:txBody>
+      </p:sp>
+      <p:sp>
+        <p:nvSpPr>
+          <p:cNvPr id="76" name="椭圆 6"/>
+          <p:cNvSpPr/>
+          <p:nvPr>
+            <p:custDataLst>
+              <p:tags r:id="rId6"/>
+            </p:custDataLst>
+          </p:nvPr>
+        </p:nvSpPr>
+        <p:spPr>
+          <a:xfrm>
+            <a:off x="6858000" y="2024380"/>
+            <a:ext cx="3436620" cy="3437255"/>
+          </a:xfrm>
+          <a:prstGeom prst="ellipse">
+            <a:avLst/>
+          </a:prstGeom>
+          <a:noFill/>
+          <a:ln>
+            <a:solidFill>
+              <a:schemeClr val="accent1"/>
+            </a:solidFill>
+          </a:ln>
+          <a:effectLst>
+            <a:outerShdw blurRad="50800" dist="38100" dir="2700000" algn="tl" rotWithShape="0">
+              <a:schemeClr val="accent1">
+                <a:alpha val="40000"/>
+              </a:schemeClr>
+            </a:outerShdw>
+          </a:effectLst>
+        </p:spPr>
+        <p:style>
+          <a:lnRef idx="2">
+            <a:schemeClr val="accent1">
+              <a:shade val="50000"/>
+            </a:schemeClr>
+          </a:lnRef>
+          <a:fillRef idx="1">
+            <a:schemeClr val="accent1"/>
+          </a:fillRef>
+          <a:effectRef idx="0">
+            <a:schemeClr val="accent1"/>
+          </a:effectRef>
+          <a:fontRef idx="minor">
+            <a:schemeClr val="lt1"/>
+          </a:fontRef>
+        </p:style>
+        <p:txBody>
+          <a:bodyPr rtlCol="0" anchor="ctr"/>
+          <a:p>
+            <a:pPr algn="ctr"/>
+            <a:endParaRPr lang="en-US"/>
+          </a:p>
+        </p:txBody>
+      </p:sp>
+      <p:grpSp>
+        <p:nvGrpSpPr>
+          <p:cNvPr id="16" name="Group 15"/>
+          <p:cNvGrpSpPr/>
+          <p:nvPr/>
+        </p:nvGrpSpPr>
+        <p:grpSpPr>
+          <a:xfrm rot="0">
+            <a:off x="7031355" y="4674870"/>
+            <a:ext cx="762000" cy="762000"/>
+            <a:chOff x="11379" y="3952"/>
+            <a:chExt cx="1200" cy="1200"/>
+          </a:xfrm>
+        </p:grpSpPr>
+        <p:sp>
+          <p:nvSpPr>
+            <p:cNvPr id="9" name="Oval 8"/>
+            <p:cNvSpPr/>
+            <p:nvPr/>
+          </p:nvSpPr>
+          <p:spPr>
+            <a:xfrm>
+              <a:off x="11379" y="3952"/>
+              <a:ext cx="1201" cy="1201"/>
+            </a:xfrm>
+            <a:prstGeom prst="ellipse">
+              <a:avLst/>
+            </a:prstGeom>
+            <a:solidFill>
+              <a:schemeClr val="bg1">
+                <a:lumMod val="95000"/>
+              </a:schemeClr>
+            </a:solidFill>
+            <a:ln>
+              <a:solidFill>
+                <a:schemeClr val="bg1">
+                  <a:lumMod val="85000"/>
+                </a:schemeClr>
+              </a:solidFill>
+            </a:ln>
+          </p:spPr>
+          <p:style>
+            <a:lnRef idx="2">
+              <a:schemeClr val="accent1">
+                <a:lumMod val="75000"/>
+              </a:schemeClr>
+            </a:lnRef>
+            <a:fillRef idx="1">
+              <a:schemeClr val="accent1"/>
+            </a:fillRef>
+            <a:effectRef idx="0">
+              <a:srgbClr val="FFFFFF"/>
+            </a:effectRef>
+            <a:fontRef idx="minor">
+              <a:schemeClr val="lt1"/>
+            </a:fontRef>
+          </p:style>
+          <p:txBody>
+            <a:bodyPr rtlCol="0" anchor="ctr"/>
+            <a:p>
+              <a:pPr algn="ctr"/>
+              <a:endParaRPr lang="en-GB" altLang="en-US"/>
+            </a:p>
+          </p:txBody>
+        </p:sp>
+        <p:pic>
+          <p:nvPicPr>
+            <p:cNvPr id="13" name="Picture 12" descr="speedometer-svgrepo-com"/>
+            <p:cNvPicPr>
+              <a:picLocks noChangeAspect="1"/>
+            </p:cNvPicPr>
+            <p:nvPr/>
+          </p:nvPicPr>
+          <p:blipFill>
+            <a:blip r:embed="rId7">
+              <a:extLst>
+                <a:ext uri="{96DAC541-7B7A-43D3-8B79-37D633B846F1}">
+                  <asvg:svgBlip xmlns:asvg="http://schemas.microsoft.com/office/drawing/2016/SVG/main" r:embed="rId8"/>
+                </a:ext>
+              </a:extLst>
+            </a:blip>
+            <a:stretch>
+              <a:fillRect/>
+            </a:stretch>
+          </p:blipFill>
+          <p:spPr>
+            <a:xfrm>
+              <a:off x="11639" y="4212"/>
+              <a:ext cx="680" cy="680"/>
+            </a:xfrm>
+            <a:prstGeom prst="rect">
+              <a:avLst/>
+            </a:prstGeom>
+          </p:spPr>
+        </p:pic>
+      </p:grpSp>
+      <p:grpSp>
+        <p:nvGrpSpPr>
+          <p:cNvPr id="15" name="Group 14"/>
+          <p:cNvGrpSpPr/>
+          <p:nvPr/>
+        </p:nvGrpSpPr>
+        <p:grpSpPr>
+          <a:xfrm rot="0">
+            <a:off x="9772015" y="3859530"/>
+            <a:ext cx="762000" cy="762000"/>
+            <a:chOff x="9600" y="5153"/>
+            <a:chExt cx="1200" cy="1200"/>
+          </a:xfrm>
+        </p:grpSpPr>
+        <p:sp>
+          <p:nvSpPr>
+            <p:cNvPr id="8" name="Oval 7"/>
+            <p:cNvSpPr/>
+            <p:nvPr/>
+          </p:nvSpPr>
+          <p:spPr>
+            <a:xfrm>
+              <a:off x="9600" y="5153"/>
+              <a:ext cx="1201" cy="1201"/>
+            </a:xfrm>
+            <a:prstGeom prst="ellipse">
+              <a:avLst/>
+            </a:prstGeom>
+            <a:solidFill>
+              <a:schemeClr val="bg1">
+                <a:lumMod val="95000"/>
+              </a:schemeClr>
+            </a:solidFill>
+            <a:ln>
+              <a:solidFill>
+                <a:schemeClr val="bg1">
+                  <a:lumMod val="85000"/>
+                </a:schemeClr>
+              </a:solidFill>
+            </a:ln>
+          </p:spPr>
+          <p:style>
+            <a:lnRef idx="2">
+              <a:schemeClr val="accent1">
+                <a:lumMod val="75000"/>
+              </a:schemeClr>
+            </a:lnRef>
+            <a:fillRef idx="1">
+              <a:schemeClr val="accent1"/>
+            </a:fillRef>
+            <a:effectRef idx="0">
+              <a:srgbClr val="FFFFFF"/>
+            </a:effectRef>
+            <a:fontRef idx="minor">
+              <a:schemeClr val="lt1"/>
+            </a:fontRef>
+          </p:style>
+          <p:txBody>
+            <a:bodyPr rtlCol="0" anchor="ctr"/>
+            <a:p>
+              <a:pPr algn="ctr"/>
+              <a:endParaRPr lang="en-GB" altLang="en-US"/>
+            </a:p>
+          </p:txBody>
+        </p:sp>
+        <p:pic>
+          <p:nvPicPr>
+            <p:cNvPr id="12" name="Picture 11" descr="lock-alt-svgrepo-com"/>
+            <p:cNvPicPr>
+              <a:picLocks noChangeAspect="1"/>
+            </p:cNvPicPr>
+            <p:nvPr/>
+          </p:nvPicPr>
+          <p:blipFill>
+            <a:blip r:embed="rId9">
+              <a:extLst>
+                <a:ext uri="{96DAC541-7B7A-43D3-8B79-37D633B846F1}">
+                  <asvg:svgBlip xmlns:asvg="http://schemas.microsoft.com/office/drawing/2016/SVG/main" r:embed="rId10"/>
+                </a:ext>
+              </a:extLst>
+            </a:blip>
+            <a:stretch>
+              <a:fillRect/>
+            </a:stretch>
+          </p:blipFill>
+          <p:spPr>
+            <a:xfrm>
+              <a:off x="9875" y="5413"/>
+              <a:ext cx="680" cy="680"/>
+            </a:xfrm>
+            <a:prstGeom prst="rect">
+              <a:avLst/>
+            </a:prstGeom>
+          </p:spPr>
+        </p:pic>
+      </p:grpSp>
+      <p:grpSp>
+        <p:nvGrpSpPr>
+          <p:cNvPr id="17" name="Group 16"/>
+          <p:cNvGrpSpPr/>
+          <p:nvPr/>
+        </p:nvGrpSpPr>
+        <p:grpSpPr>
+          <a:xfrm rot="0">
+            <a:off x="7753350" y="1729740"/>
+            <a:ext cx="762000" cy="762000"/>
+            <a:chOff x="11379" y="6354"/>
+            <a:chExt cx="1200" cy="1200"/>
+          </a:xfrm>
+        </p:grpSpPr>
+        <p:sp>
+          <p:nvSpPr>
+            <p:cNvPr id="10" name="Oval 9"/>
+            <p:cNvSpPr/>
+            <p:nvPr/>
+          </p:nvSpPr>
+          <p:spPr>
+            <a:xfrm>
+              <a:off x="11379" y="6354"/>
+              <a:ext cx="1201" cy="1201"/>
+            </a:xfrm>
+            <a:prstGeom prst="ellipse">
+              <a:avLst/>
+            </a:prstGeom>
+            <a:solidFill>
+              <a:schemeClr val="bg1">
+                <a:lumMod val="95000"/>
+              </a:schemeClr>
+            </a:solidFill>
+            <a:ln>
+              <a:solidFill>
+                <a:schemeClr val="bg1">
+                  <a:lumMod val="85000"/>
+                </a:schemeClr>
+              </a:solidFill>
+            </a:ln>
+          </p:spPr>
+          <p:style>
+            <a:lnRef idx="2">
+              <a:schemeClr val="accent1">
+                <a:lumMod val="75000"/>
+              </a:schemeClr>
+            </a:lnRef>
+            <a:fillRef idx="1">
+              <a:schemeClr val="accent1"/>
+            </a:fillRef>
+            <a:effectRef idx="0">
+              <a:srgbClr val="FFFFFF"/>
+            </a:effectRef>
+            <a:fontRef idx="minor">
+              <a:schemeClr val="lt1"/>
+            </a:fontRef>
+          </p:style>
+          <p:txBody>
+            <a:bodyPr rtlCol="0" anchor="ctr"/>
+            <a:p>
+              <a:pPr algn="ctr"/>
+              <a:endParaRPr lang="en-GB" altLang="en-US"/>
+            </a:p>
+          </p:txBody>
+        </p:sp>
+        <p:pic>
+          <p:nvPicPr>
+            <p:cNvPr id="14" name="Picture 13" descr="cloud-download-svgrepo-com"/>
+            <p:cNvPicPr>
+              <a:picLocks noChangeAspect="1"/>
+            </p:cNvPicPr>
+            <p:nvPr/>
+          </p:nvPicPr>
+          <p:blipFill>
+            <a:blip r:embed="rId11">
+              <a:extLst>
+                <a:ext uri="{96DAC541-7B7A-43D3-8B79-37D633B846F1}">
+                  <asvg:svgBlip xmlns:asvg="http://schemas.microsoft.com/office/drawing/2016/SVG/main" r:embed="rId12"/>
+                </a:ext>
+              </a:extLst>
+            </a:blip>
+            <a:stretch>
+              <a:fillRect/>
+            </a:stretch>
+          </p:blipFill>
+          <p:spPr>
+            <a:xfrm>
+              <a:off x="11639" y="6614"/>
+              <a:ext cx="680" cy="680"/>
+            </a:xfrm>
+            <a:prstGeom prst="rect">
+              <a:avLst/>
+            </a:prstGeom>
+          </p:spPr>
+        </p:pic>
+      </p:grpSp>
     </p:spTree>
-    <p:extLst>
-      <p:ext uri="{BB962C8B-B14F-4D97-AF65-F5344CB8AC3E}">
-        <p14:creationId xmlns:p14="http://schemas.microsoft.com/office/powerpoint/2010/main" val="3072013332"/>
-      </p:ext>
-    </p:extLst>
   </p:cSld>
   <p:clrMapOvr>
     <a:masterClrMapping/>
   </p:clrMapOvr>
 </p:sld>
+</file>
+
+<file path=ppt/slides/slide2.xml><?xml version="1.0" encoding="utf-8"?>
+<p:sld xmlns:a="http://schemas.openxmlformats.org/drawingml/2006/main" xmlns:r="http://schemas.openxmlformats.org/officeDocument/2006/relationships" xmlns:p="http://schemas.openxmlformats.org/presentationml/2006/main">
+  <p:cSld>
+    <p:bg>
+      <p:bgPr>
+        <a:solidFill>
+          <a:schemeClr val="bg1">
+            <a:lumMod val="85000"/>
+            <a:alpha val="40000"/>
+          </a:schemeClr>
+        </a:solidFill>
+        <a:effectLst/>
+      </p:bgPr>
+    </p:bg>
+    <p:spTree>
+      <p:nvGrpSpPr>
+        <p:cNvPr id="1" name=""/>
+        <p:cNvGrpSpPr/>
+        <p:nvPr/>
+      </p:nvGrpSpPr>
+      <p:grpSpPr>
+        <a:xfrm>
+          <a:off x="0" y="0"/>
+          <a:ext cx="0" cy="0"/>
+          <a:chOff x="0" y="0"/>
+          <a:chExt cx="0" cy="0"/>
+        </a:xfrm>
+      </p:grpSpPr>
+      <p:sp>
+        <p:nvSpPr>
+          <p:cNvPr id="4" name="Rectangles 3"/>
+          <p:cNvSpPr/>
+          <p:nvPr/>
+        </p:nvSpPr>
+        <p:spPr>
+          <a:xfrm>
+            <a:off x="584200" y="463550"/>
+            <a:ext cx="11132185" cy="5862320"/>
+          </a:xfrm>
+          <a:prstGeom prst="rect">
+            <a:avLst/>
+          </a:prstGeom>
+          <a:solidFill>
+            <a:schemeClr val="bg1"/>
+          </a:solidFill>
+          <a:ln>
+            <a:noFill/>
+          </a:ln>
+          <a:effectLst>
+            <a:outerShdw blurRad="50800" dist="38100" dir="8100000" algn="tr" rotWithShape="0">
+              <a:prstClr val="black">
+                <a:alpha val="25000"/>
+              </a:prstClr>
+            </a:outerShdw>
+          </a:effectLst>
+        </p:spPr>
+        <p:style>
+          <a:lnRef idx="2">
+            <a:schemeClr val="accent1">
+              <a:lumMod val="75000"/>
+            </a:schemeClr>
+          </a:lnRef>
+          <a:fillRef idx="1">
+            <a:schemeClr val="accent1"/>
+          </a:fillRef>
+          <a:effectRef idx="0">
+            <a:srgbClr val="FFFFFF"/>
+          </a:effectRef>
+          <a:fontRef idx="minor">
+            <a:schemeClr val="lt1"/>
+          </a:fontRef>
+        </p:style>
+        <p:txBody>
+          <a:bodyPr rtlCol="0" anchor="ctr"/>
+          <a:p>
+            <a:pPr algn="ctr"/>
+            <a:endParaRPr lang="en-GB" altLang="en-US"/>
+          </a:p>
+        </p:txBody>
+      </p:sp>
+      <p:cxnSp>
+        <p:nvCxnSpPr>
+          <p:cNvPr id="5" name="Straight Connector 4"/>
+          <p:cNvCxnSpPr/>
+          <p:nvPr/>
+        </p:nvCxnSpPr>
+        <p:spPr>
+          <a:xfrm>
+            <a:off x="584200" y="5459095"/>
+            <a:ext cx="969645" cy="3175"/>
+          </a:xfrm>
+          <a:prstGeom prst="line">
+            <a:avLst/>
+          </a:prstGeom>
+        </p:spPr>
+        <p:style>
+          <a:lnRef idx="3">
+            <a:prstClr val="black"/>
+          </a:lnRef>
+          <a:fillRef idx="0">
+            <a:srgbClr val="FFFFFF"/>
+          </a:fillRef>
+          <a:effectRef idx="0">
+            <a:srgbClr val="FFFFFF"/>
+          </a:effectRef>
+          <a:fontRef idx="minor">
+            <a:schemeClr val="tx1"/>
+          </a:fontRef>
+        </p:style>
+      </p:cxnSp>
+      <p:sp>
+        <p:nvSpPr>
+          <p:cNvPr id="6" name="Text Box 5"/>
+          <p:cNvSpPr txBox="1"/>
+          <p:nvPr/>
+        </p:nvSpPr>
+        <p:spPr>
+          <a:xfrm>
+            <a:off x="984250" y="1050290"/>
+            <a:ext cx="1530985" cy="398780"/>
+          </a:xfrm>
+          <a:prstGeom prst="rect">
+            <a:avLst/>
+          </a:prstGeom>
+          <a:noFill/>
+        </p:spPr>
+        <p:txBody>
+          <a:bodyPr wrap="square" rtlCol="0">
+            <a:spAutoFit/>
+          </a:bodyPr>
+          <a:p>
+            <a:r>
+              <a:rPr lang="it-IT" altLang="en-US" sz="2000" b="1">
+                <a:effectLst/>
+              </a:rPr>
+              <a:t>Motivation</a:t>
+            </a:r>
+            <a:endParaRPr lang="it-IT" altLang="en-US" sz="2000" b="1">
+              <a:effectLst/>
+            </a:endParaRPr>
+          </a:p>
+        </p:txBody>
+      </p:sp>
+      <p:sp>
+        <p:nvSpPr>
+          <p:cNvPr id="7" name="Text Box 6"/>
+          <p:cNvSpPr txBox="1"/>
+          <p:nvPr/>
+        </p:nvSpPr>
+        <p:spPr>
+          <a:xfrm>
+            <a:off x="913130" y="5642610"/>
+            <a:ext cx="311150" cy="306705"/>
+          </a:xfrm>
+          <a:prstGeom prst="rect">
+            <a:avLst/>
+          </a:prstGeom>
+          <a:noFill/>
+        </p:spPr>
+        <p:txBody>
+          <a:bodyPr wrap="square" rtlCol="0">
+            <a:spAutoFit/>
+          </a:bodyPr>
+          <a:p>
+            <a:r>
+              <a:rPr lang="it-IT" altLang="en-GB" sz="1400"/>
+              <a:t>2</a:t>
+            </a:r>
+            <a:endParaRPr lang="it-IT" altLang="en-GB" sz="1400"/>
+          </a:p>
+        </p:txBody>
+      </p:sp>
+      <p:sp>
+        <p:nvSpPr>
+          <p:cNvPr id="2" name="Text Box 1"/>
+          <p:cNvSpPr txBox="1"/>
+          <p:nvPr/>
+        </p:nvSpPr>
+        <p:spPr>
+          <a:xfrm>
+            <a:off x="984250" y="2101850"/>
+            <a:ext cx="2629535" cy="368300"/>
+          </a:xfrm>
+          <a:prstGeom prst="rect">
+            <a:avLst/>
+          </a:prstGeom>
+          <a:noFill/>
+        </p:spPr>
+        <p:txBody>
+          <a:bodyPr wrap="square" rtlCol="0">
+            <a:spAutoFit/>
+          </a:bodyPr>
+          <a:p>
+            <a:r>
+              <a:rPr lang="it-IT" altLang="en-GB"/>
+              <a:t>Why does this matter?</a:t>
+            </a:r>
+            <a:endParaRPr lang="it-IT" altLang="en-GB"/>
+          </a:p>
+        </p:txBody>
+      </p:sp>
+    </p:spTree>
+  </p:cSld>
+  <p:clrMapOvr>
+    <a:masterClrMapping/>
+  </p:clrMapOvr>
+</p:sld>
+</file>
+
+<file path=ppt/slides/slide3.xml><?xml version="1.0" encoding="utf-8"?>
+<p:sld xmlns:a="http://schemas.openxmlformats.org/drawingml/2006/main" xmlns:r="http://schemas.openxmlformats.org/officeDocument/2006/relationships" xmlns:p="http://schemas.openxmlformats.org/presentationml/2006/main">
+  <p:cSld>
+    <p:bg>
+      <p:bgPr>
+        <a:solidFill>
+          <a:schemeClr val="bg1">
+            <a:lumMod val="85000"/>
+            <a:alpha val="40000"/>
+          </a:schemeClr>
+        </a:solidFill>
+        <a:effectLst/>
+      </p:bgPr>
+    </p:bg>
+    <p:spTree>
+      <p:nvGrpSpPr>
+        <p:cNvPr id="1" name=""/>
+        <p:cNvGrpSpPr/>
+        <p:nvPr/>
+      </p:nvGrpSpPr>
+      <p:grpSpPr>
+        <a:xfrm>
+          <a:off x="0" y="0"/>
+          <a:ext cx="0" cy="0"/>
+          <a:chOff x="0" y="0"/>
+          <a:chExt cx="0" cy="0"/>
+        </a:xfrm>
+      </p:grpSpPr>
+      <p:sp>
+        <p:nvSpPr>
+          <p:cNvPr id="4" name="Rectangles 3"/>
+          <p:cNvSpPr/>
+          <p:nvPr/>
+        </p:nvSpPr>
+        <p:spPr>
+          <a:xfrm>
+            <a:off x="584200" y="463550"/>
+            <a:ext cx="11132185" cy="5862320"/>
+          </a:xfrm>
+          <a:prstGeom prst="rect">
+            <a:avLst/>
+          </a:prstGeom>
+          <a:solidFill>
+            <a:schemeClr val="bg1"/>
+          </a:solidFill>
+          <a:ln>
+            <a:noFill/>
+          </a:ln>
+          <a:effectLst>
+            <a:outerShdw blurRad="50800" dist="38100" dir="8100000" algn="tr" rotWithShape="0">
+              <a:prstClr val="black">
+                <a:alpha val="25000"/>
+              </a:prstClr>
+            </a:outerShdw>
+          </a:effectLst>
+        </p:spPr>
+        <p:style>
+          <a:lnRef idx="2">
+            <a:schemeClr val="accent1">
+              <a:lumMod val="75000"/>
+            </a:schemeClr>
+          </a:lnRef>
+          <a:fillRef idx="1">
+            <a:schemeClr val="accent1"/>
+          </a:fillRef>
+          <a:effectRef idx="0">
+            <a:srgbClr val="FFFFFF"/>
+          </a:effectRef>
+          <a:fontRef idx="minor">
+            <a:schemeClr val="lt1"/>
+          </a:fontRef>
+        </p:style>
+        <p:txBody>
+          <a:bodyPr rtlCol="0" anchor="ctr"/>
+          <a:p>
+            <a:pPr algn="ctr"/>
+            <a:endParaRPr lang="en-GB" altLang="en-US"/>
+          </a:p>
+        </p:txBody>
+      </p:sp>
+      <p:cxnSp>
+        <p:nvCxnSpPr>
+          <p:cNvPr id="5" name="Straight Connector 4"/>
+          <p:cNvCxnSpPr/>
+          <p:nvPr/>
+        </p:nvCxnSpPr>
+        <p:spPr>
+          <a:xfrm>
+            <a:off x="584200" y="5459095"/>
+            <a:ext cx="969645" cy="3175"/>
+          </a:xfrm>
+          <a:prstGeom prst="line">
+            <a:avLst/>
+          </a:prstGeom>
+        </p:spPr>
+        <p:style>
+          <a:lnRef idx="3">
+            <a:prstClr val="black"/>
+          </a:lnRef>
+          <a:fillRef idx="0">
+            <a:srgbClr val="FFFFFF"/>
+          </a:fillRef>
+          <a:effectRef idx="0">
+            <a:srgbClr val="FFFFFF"/>
+          </a:effectRef>
+          <a:fontRef idx="minor">
+            <a:schemeClr val="tx1"/>
+          </a:fontRef>
+        </p:style>
+      </p:cxnSp>
+      <p:sp>
+        <p:nvSpPr>
+          <p:cNvPr id="6" name="Text Box 5"/>
+          <p:cNvSpPr txBox="1"/>
+          <p:nvPr/>
+        </p:nvSpPr>
+        <p:spPr>
+          <a:xfrm>
+            <a:off x="984250" y="1050290"/>
+            <a:ext cx="1991995" cy="398780"/>
+          </a:xfrm>
+          <a:prstGeom prst="rect">
+            <a:avLst/>
+          </a:prstGeom>
+          <a:noFill/>
+        </p:spPr>
+        <p:txBody>
+          <a:bodyPr wrap="square" rtlCol="0">
+            <a:spAutoFit/>
+          </a:bodyPr>
+          <a:p>
+            <a:r>
+              <a:rPr lang="it-IT" altLang="en-US" sz="2000" b="1">
+                <a:effectLst/>
+              </a:rPr>
+              <a:t>State of the Art</a:t>
+            </a:r>
+            <a:endParaRPr lang="it-IT" altLang="en-US" sz="2000" b="1">
+              <a:effectLst/>
+            </a:endParaRPr>
+          </a:p>
+        </p:txBody>
+      </p:sp>
+      <p:sp>
+        <p:nvSpPr>
+          <p:cNvPr id="7" name="Text Box 6"/>
+          <p:cNvSpPr txBox="1"/>
+          <p:nvPr/>
+        </p:nvSpPr>
+        <p:spPr>
+          <a:xfrm>
+            <a:off x="913130" y="5642610"/>
+            <a:ext cx="311150" cy="306705"/>
+          </a:xfrm>
+          <a:prstGeom prst="rect">
+            <a:avLst/>
+          </a:prstGeom>
+          <a:noFill/>
+        </p:spPr>
+        <p:txBody>
+          <a:bodyPr wrap="square" rtlCol="0">
+            <a:spAutoFit/>
+          </a:bodyPr>
+          <a:p>
+            <a:r>
+              <a:rPr lang="it-IT" altLang="en-GB" sz="1400"/>
+              <a:t>3</a:t>
+            </a:r>
+            <a:endParaRPr lang="it-IT" altLang="en-GB" sz="1400"/>
+          </a:p>
+        </p:txBody>
+      </p:sp>
+    </p:spTree>
+  </p:cSld>
+  <p:clrMapOvr>
+    <a:masterClrMapping/>
+  </p:clrMapOvr>
+</p:sld>
+</file>
+
+<file path=ppt/slides/slide4.xml><?xml version="1.0" encoding="utf-8"?>
+<p:sld xmlns:a="http://schemas.openxmlformats.org/drawingml/2006/main" xmlns:r="http://schemas.openxmlformats.org/officeDocument/2006/relationships" xmlns:p="http://schemas.openxmlformats.org/presentationml/2006/main">
+  <p:cSld>
+    <p:bg>
+      <p:bgPr>
+        <a:solidFill>
+          <a:schemeClr val="bg1">
+            <a:lumMod val="85000"/>
+            <a:alpha val="40000"/>
+          </a:schemeClr>
+        </a:solidFill>
+        <a:effectLst/>
+      </p:bgPr>
+    </p:bg>
+    <p:spTree>
+      <p:nvGrpSpPr>
+        <p:cNvPr id="1" name=""/>
+        <p:cNvGrpSpPr/>
+        <p:nvPr/>
+      </p:nvGrpSpPr>
+      <p:grpSpPr>
+        <a:xfrm>
+          <a:off x="0" y="0"/>
+          <a:ext cx="0" cy="0"/>
+          <a:chOff x="0" y="0"/>
+          <a:chExt cx="0" cy="0"/>
+        </a:xfrm>
+      </p:grpSpPr>
+      <p:sp>
+        <p:nvSpPr>
+          <p:cNvPr id="4" name="Rectangles 3"/>
+          <p:cNvSpPr/>
+          <p:nvPr/>
+        </p:nvSpPr>
+        <p:spPr>
+          <a:xfrm>
+            <a:off x="584200" y="463550"/>
+            <a:ext cx="11132185" cy="5862320"/>
+          </a:xfrm>
+          <a:prstGeom prst="rect">
+            <a:avLst/>
+          </a:prstGeom>
+          <a:solidFill>
+            <a:schemeClr val="bg1"/>
+          </a:solidFill>
+          <a:ln>
+            <a:noFill/>
+          </a:ln>
+          <a:effectLst>
+            <a:outerShdw blurRad="50800" dist="38100" dir="8100000" algn="tr" rotWithShape="0">
+              <a:prstClr val="black">
+                <a:alpha val="25000"/>
+              </a:prstClr>
+            </a:outerShdw>
+          </a:effectLst>
+        </p:spPr>
+        <p:style>
+          <a:lnRef idx="2">
+            <a:schemeClr val="accent1">
+              <a:lumMod val="75000"/>
+            </a:schemeClr>
+          </a:lnRef>
+          <a:fillRef idx="1">
+            <a:schemeClr val="accent1"/>
+          </a:fillRef>
+          <a:effectRef idx="0">
+            <a:srgbClr val="FFFFFF"/>
+          </a:effectRef>
+          <a:fontRef idx="minor">
+            <a:schemeClr val="lt1"/>
+          </a:fontRef>
+        </p:style>
+        <p:txBody>
+          <a:bodyPr rtlCol="0" anchor="ctr"/>
+          <a:p>
+            <a:pPr algn="ctr"/>
+            <a:endParaRPr lang="en-GB" altLang="en-US"/>
+          </a:p>
+        </p:txBody>
+      </p:sp>
+      <p:cxnSp>
+        <p:nvCxnSpPr>
+          <p:cNvPr id="5" name="Straight Connector 4"/>
+          <p:cNvCxnSpPr/>
+          <p:nvPr/>
+        </p:nvCxnSpPr>
+        <p:spPr>
+          <a:xfrm>
+            <a:off x="584200" y="5459095"/>
+            <a:ext cx="969645" cy="3175"/>
+          </a:xfrm>
+          <a:prstGeom prst="line">
+            <a:avLst/>
+          </a:prstGeom>
+        </p:spPr>
+        <p:style>
+          <a:lnRef idx="3">
+            <a:prstClr val="black"/>
+          </a:lnRef>
+          <a:fillRef idx="0">
+            <a:srgbClr val="FFFFFF"/>
+          </a:fillRef>
+          <a:effectRef idx="0">
+            <a:srgbClr val="FFFFFF"/>
+          </a:effectRef>
+          <a:fontRef idx="minor">
+            <a:schemeClr val="tx1"/>
+          </a:fontRef>
+        </p:style>
+      </p:cxnSp>
+      <p:sp>
+        <p:nvSpPr>
+          <p:cNvPr id="6" name="Text Box 5"/>
+          <p:cNvSpPr txBox="1"/>
+          <p:nvPr/>
+        </p:nvSpPr>
+        <p:spPr>
+          <a:xfrm>
+            <a:off x="984250" y="1050290"/>
+            <a:ext cx="2240915" cy="706755"/>
+          </a:xfrm>
+          <a:prstGeom prst="rect">
+            <a:avLst/>
+          </a:prstGeom>
+          <a:noFill/>
+        </p:spPr>
+        <p:txBody>
+          <a:bodyPr wrap="square" rtlCol="0">
+            <a:spAutoFit/>
+          </a:bodyPr>
+          <a:p>
+            <a:r>
+              <a:rPr lang="it-IT" altLang="en-US" sz="2000" b="1">
+                <a:effectLst/>
+              </a:rPr>
+              <a:t>Implementation Overview</a:t>
+            </a:r>
+            <a:endParaRPr lang="it-IT" altLang="en-US" sz="2000" b="1">
+              <a:effectLst/>
+            </a:endParaRPr>
+          </a:p>
+        </p:txBody>
+      </p:sp>
+      <p:sp>
+        <p:nvSpPr>
+          <p:cNvPr id="7" name="Text Box 6"/>
+          <p:cNvSpPr txBox="1"/>
+          <p:nvPr/>
+        </p:nvSpPr>
+        <p:spPr>
+          <a:xfrm>
+            <a:off x="924560" y="5642610"/>
+            <a:ext cx="311150" cy="306705"/>
+          </a:xfrm>
+          <a:prstGeom prst="rect">
+            <a:avLst/>
+          </a:prstGeom>
+          <a:noFill/>
+        </p:spPr>
+        <p:txBody>
+          <a:bodyPr wrap="square" rtlCol="0">
+            <a:spAutoFit/>
+          </a:bodyPr>
+          <a:p>
+            <a:r>
+              <a:rPr lang="it-IT" altLang="en-GB" sz="1400"/>
+              <a:t>4</a:t>
+            </a:r>
+            <a:endParaRPr lang="it-IT" altLang="en-GB" sz="1400"/>
+          </a:p>
+        </p:txBody>
+      </p:sp>
+    </p:spTree>
+  </p:cSld>
+  <p:clrMapOvr>
+    <a:masterClrMapping/>
+  </p:clrMapOvr>
+</p:sld>
+</file>
+
+<file path=ppt/tags/tag1.xml><?xml version="1.0" encoding="utf-8"?>
+<p:tagLst xmlns:p="http://schemas.openxmlformats.org/presentationml/2006/main">
+  <p:tag name="KSO_WM_UNIT_HIGHLIGHT" val="0"/>
+  <p:tag name="KSO_WM_UNIT_COMPATIBLE" val="0"/>
+  <p:tag name="KSO_WM_UNIT_DIAGRAM_ISNUMVISUAL" val="0"/>
+  <p:tag name="KSO_WM_UNIT_DIAGRAM_ISREFERUNIT" val="0"/>
+  <p:tag name="KSO_WM_UNIT_ID" val="diagram20238176_2*n_h_i*1_1_2"/>
+  <p:tag name="KSO_WM_TEMPLATE_CATEGORY" val="diagram"/>
+  <p:tag name="KSO_WM_TEMPLATE_INDEX" val="20238176"/>
+  <p:tag name="KSO_WM_UNIT_LAYERLEVEL" val="1_1_1"/>
+  <p:tag name="KSO_WM_TAG_VERSION" val="3.0"/>
+  <p:tag name="KSO_WM_DIAGRAM_VERSION" val="3"/>
+  <p:tag name="KSO_WM_DIAGRAM_COLOR_TRICK" val="1"/>
+  <p:tag name="KSO_WM_DIAGRAM_COLOR_TEXT_CAN_REMOVE" val="n"/>
+  <p:tag name="KSO_WM_DIAGRAM_GROUP_CODE" val="n1-1"/>
+  <p:tag name="KSO_WM_UNIT_TYPE" val="n_h_i"/>
+  <p:tag name="KSO_WM_UNIT_INDEX" val="1_1_2"/>
+  <p:tag name="KSO_WM_DIAGRAM_MAX_ITEMCNT" val="6"/>
+  <p:tag name="KSO_WM_DIAGRAM_MIN_ITEMCNT" val="2"/>
+  <p:tag name="KSO_WM_DIAGRAM_VIRTUALLY_FRAME" val="{&quot;height&quot;:372.9,&quot;left&quot;:53.57498779296875,&quot;top&quot;:83.6,&quot;width&quot;:852.9000244140625}"/>
+  <p:tag name="KSO_WM_DIAGRAM_COLOR_MATCH_VALUE" val="{&quot;shape&quot;:{&quot;fill&quot;:{&quot;solid&quot;:{&quot;brightness&quot;:0.800000011920929,&quot;colorType&quot;:1,&quot;foreColorIndex&quot;:5,&quot;transparency&quot;:0.4000000059604645},&quot;type&quot;:1},&quot;glow&quot;:{&quot;colorType&quot;:0},&quot;line&quot;:{&quot;type&quot;:0},&quot;shadow&quot;:{&quot;colorType&quot;:0},&quot;threeD&quot;:{&quot;curvedSurface&quot;:{&quot;brightness&quot;:0,&quot;colorType&quot;:2,&quot;rgb&quot;:&quot;#000000&quot;},&quot;depth&quot;:{&quot;colorType&quot;:0}}},&quot;text&quot;:{&quot;fill&quot;:{&quot;solid&quot;:{&quot;brightness&quot;:0,&quot;colorType&quot;:1,&quot;foreColorIndex&quot;:2,&quot;transparency&quot;:0},&quot;type&quot;:1},&quot;glow&quot;:{&quot;colorType&quot;:0},&quot;line&quot;:{&quot;type&quot;:0},&quot;shadow&quot;:{&quot;colorType&quot;:0},&quot;threeD&quot;:{&quot;curvedSurface&quot;:{&quot;brightness&quot;:0,&quot;colorType&quot;:2,&quot;rgb&quot;:&quot;#000000&quot;},&quot;depth&quot;:{&quot;colorType&quot;:0}}}}"/>
+  <p:tag name="KSO_WM_UNIT_FILL_TYPE" val="1"/>
+  <p:tag name="KSO_WM_UNIT_FILL_FORE_SCHEMECOLOR_INDEX" val="5"/>
+  <p:tag name="KSO_WM_UNIT_FILL_FORE_SCHEMECOLOR_INDEX_BRIGHTNESS" val="0.8"/>
+  <p:tag name="KSO_WM_DIAGRAM_USE_COLOR_VALUE" val="{&quot;color_scheme&quot;:1,&quot;color_type&quot;:1,&quot;theme_color_indexes&quot;:[]}"/>
+</p:tagLst>
+</file>
+
+<file path=ppt/tags/tag2.xml><?xml version="1.0" encoding="utf-8"?>
+<p:tagLst xmlns:p="http://schemas.openxmlformats.org/presentationml/2006/main">
+  <p:tag name="KSO_WM_UNIT_HIGHLIGHT" val="0"/>
+  <p:tag name="KSO_WM_UNIT_COMPATIBLE" val="0"/>
+  <p:tag name="KSO_WM_UNIT_DIAGRAM_ISNUMVISUAL" val="0"/>
+  <p:tag name="KSO_WM_UNIT_DIAGRAM_ISREFERUNIT" val="0"/>
+  <p:tag name="KSO_WM_UNIT_ID" val="diagram20238176_2*n_h_h_i*1_2_2_2"/>
+  <p:tag name="KSO_WM_TEMPLATE_CATEGORY" val="diagram"/>
+  <p:tag name="KSO_WM_TEMPLATE_INDEX" val="20238176"/>
+  <p:tag name="KSO_WM_UNIT_LAYERLEVEL" val="1_1_1_1"/>
+  <p:tag name="KSO_WM_TAG_VERSION" val="3.0"/>
+  <p:tag name="KSO_WM_DIAGRAM_VERSION" val="3"/>
+  <p:tag name="KSO_WM_DIAGRAM_COLOR_TRICK" val="1"/>
+  <p:tag name="KSO_WM_DIAGRAM_COLOR_TEXT_CAN_REMOVE" val="n"/>
+  <p:tag name="KSO_WM_DIAGRAM_GROUP_CODE" val="n1-1"/>
+  <p:tag name="KSO_WM_UNIT_TYPE" val="n_h_h_i"/>
+  <p:tag name="KSO_WM_UNIT_INDEX" val="1_2_2_2"/>
+  <p:tag name="KSO_WM_DIAGRAM_MAX_ITEMCNT" val="6"/>
+  <p:tag name="KSO_WM_DIAGRAM_MIN_ITEMCNT" val="2"/>
+  <p:tag name="KSO_WM_DIAGRAM_VIRTUALLY_FRAME" val="{&quot;height&quot;:372.9,&quot;left&quot;:53.57498779296875,&quot;top&quot;:83.6,&quot;width&quot;:852.9000244140625}"/>
+  <p:tag name="KSO_WM_DIAGRAM_COLOR_MATCH_VALUE" val="{&quot;shape&quot;:{&quot;fill&quot;:{&quot;type&quot;:0},&quot;glow&quot;:{&quot;colorType&quot;:0},&quot;line&quot;:{&quot;gradient&quot;:[{&quot;brightness&quot;:0,&quot;colorType&quot;:1,&quot;foreColorIndex&quot;:5,&quot;pos&quot;:0,&quot;transparency&quot;:1},{&quot;brightness&quot;:0,&quot;colorType&quot;:1,&quot;foreColorIndex&quot;:5,&quot;pos&quot;:0.6000000238418579,&quot;transparency&quot;:0}],&quot;type&quot;:2},&quot;shadow&quot;:{&quot;brightness&quot;:-0.25,&quot;colorType&quot;:1,&quot;foreColorIndex&quot;:5,&quot;transparency&quot;:0.6000000238418579},&quot;threeD&quot;:{&quot;curvedSurface&quot;:{&quot;brightness&quot;:0,&quot;colorType&quot;:2,&quot;rgb&quot;:&quot;#000000&quot;},&quot;depth&quot;:{&quot;colorType&quot;:0}}},&quot;text&quot;:{&quot;fill&quot;:{&quot;solid&quot;:{&quot;brightness&quot;:0,&quot;colorType&quot;:1,&quot;foreColorIndex&quot;:13,&quot;transparency&quot;:0},&quot;type&quot;:1},&quot;glow&quot;:{&quot;colorType&quot;:0},&quot;line&quot;:{&quot;type&quot;:0},&quot;shadow&quot;:{&quot;colorType&quot;:0},&quot;threeD&quot;:{&quot;curvedSurface&quot;:{&quot;brightness&quot;:0,&quot;colorType&quot;:2,&quot;rgb&quot;:&quot;#000000&quot;},&quot;depth&quot;:{&quot;colorType&quot;:0}}}}"/>
+  <p:tag name="KSO_WM_DIAGRAM_USE_COLOR_VALUE" val="{&quot;color_scheme&quot;:1,&quot;color_type&quot;:1,&quot;theme_color_indexes&quot;:[]}"/>
+</p:tagLst>
+</file>
+
+<file path=ppt/tags/tag3.xml><?xml version="1.0" encoding="utf-8"?>
+<p:tagLst xmlns:p="http://schemas.openxmlformats.org/presentationml/2006/main">
+  <p:tag name="KSO_WM_UNIT_HIGHLIGHT" val="0"/>
+  <p:tag name="KSO_WM_UNIT_COMPATIBLE" val="0"/>
+  <p:tag name="KSO_WM_UNIT_DIAGRAM_ISNUMVISUAL" val="0"/>
+  <p:tag name="KSO_WM_UNIT_DIAGRAM_ISREFERUNIT" val="0"/>
+  <p:tag name="KSO_WM_UNIT_ID" val="diagram20238176_2*n_h_h_i*1_2_1_2"/>
+  <p:tag name="KSO_WM_TEMPLATE_CATEGORY" val="diagram"/>
+  <p:tag name="KSO_WM_TEMPLATE_INDEX" val="20238176"/>
+  <p:tag name="KSO_WM_UNIT_LAYERLEVEL" val="1_1_1_1"/>
+  <p:tag name="KSO_WM_TAG_VERSION" val="3.0"/>
+  <p:tag name="KSO_WM_DIAGRAM_VERSION" val="3"/>
+  <p:tag name="KSO_WM_DIAGRAM_COLOR_TRICK" val="1"/>
+  <p:tag name="KSO_WM_DIAGRAM_COLOR_TEXT_CAN_REMOVE" val="n"/>
+  <p:tag name="KSO_WM_DIAGRAM_GROUP_CODE" val="n1-1"/>
+  <p:tag name="KSO_WM_UNIT_TYPE" val="n_h_h_i"/>
+  <p:tag name="KSO_WM_UNIT_INDEX" val="1_2_1_2"/>
+  <p:tag name="KSO_WM_DIAGRAM_MAX_ITEMCNT" val="6"/>
+  <p:tag name="KSO_WM_DIAGRAM_MIN_ITEMCNT" val="2"/>
+  <p:tag name="KSO_WM_DIAGRAM_VIRTUALLY_FRAME" val="{&quot;height&quot;:372.9,&quot;left&quot;:53.57498779296875,&quot;top&quot;:83.6,&quot;width&quot;:852.9000244140625}"/>
+  <p:tag name="KSO_WM_DIAGRAM_COLOR_MATCH_VALUE" val="{&quot;shape&quot;:{&quot;fill&quot;:{&quot;type&quot;:0},&quot;glow&quot;:{&quot;colorType&quot;:0},&quot;line&quot;:{&quot;gradient&quot;:[{&quot;brightness&quot;:0,&quot;colorType&quot;:1,&quot;foreColorIndex&quot;:5,&quot;pos&quot;:0,&quot;transparency&quot;:1},{&quot;brightness&quot;:0,&quot;colorType&quot;:1,&quot;foreColorIndex&quot;:5,&quot;pos&quot;:0.6000000238418579,&quot;transparency&quot;:0}],&quot;type&quot;:2},&quot;shadow&quot;:{&quot;brightness&quot;:-0.25,&quot;colorType&quot;:1,&quot;foreColorIndex&quot;:5,&quot;transparency&quot;:0.6000000238418579},&quot;threeD&quot;:{&quot;curvedSurface&quot;:{&quot;brightness&quot;:0,&quot;colorType&quot;:2,&quot;rgb&quot;:&quot;#000000&quot;},&quot;depth&quot;:{&quot;colorType&quot;:0}}},&quot;text&quot;:{&quot;fill&quot;:{&quot;solid&quot;:{&quot;brightness&quot;:0,&quot;colorType&quot;:1,&quot;foreColorIndex&quot;:13,&quot;transparency&quot;:0},&quot;type&quot;:1},&quot;glow&quot;:{&quot;colorType&quot;:0},&quot;line&quot;:{&quot;type&quot;:0},&quot;shadow&quot;:{&quot;colorType&quot;:0},&quot;threeD&quot;:{&quot;curvedSurface&quot;:{&quot;brightness&quot;:0,&quot;colorType&quot;:2,&quot;rgb&quot;:&quot;#000000&quot;},&quot;depth&quot;:{&quot;colorType&quot;:0}}}}"/>
+  <p:tag name="KSO_WM_DIAGRAM_USE_COLOR_VALUE" val="{&quot;color_scheme&quot;:1,&quot;color_type&quot;:1,&quot;theme_color_indexes&quot;:[]}"/>
+</p:tagLst>
+</file>
+
+<file path=ppt/tags/tag4.xml><?xml version="1.0" encoding="utf-8"?>
+<p:tagLst xmlns:p="http://schemas.openxmlformats.org/presentationml/2006/main">
+  <p:tag name="KSO_WM_UNIT_HIGHLIGHT" val="0"/>
+  <p:tag name="KSO_WM_UNIT_COMPATIBLE" val="0"/>
+  <p:tag name="KSO_WM_UNIT_DIAGRAM_ISNUMVISUAL" val="0"/>
+  <p:tag name="KSO_WM_UNIT_DIAGRAM_ISREFERUNIT" val="0"/>
+  <p:tag name="KSO_WM_UNIT_ID" val="diagram20238176_2*n_h_i*1_1_1"/>
+  <p:tag name="KSO_WM_TEMPLATE_CATEGORY" val="diagram"/>
+  <p:tag name="KSO_WM_TEMPLATE_INDEX" val="20238176"/>
+  <p:tag name="KSO_WM_UNIT_LAYERLEVEL" val="1_1_1"/>
+  <p:tag name="KSO_WM_TAG_VERSION" val="3.0"/>
+  <p:tag name="KSO_WM_DIAGRAM_VERSION" val="3"/>
+  <p:tag name="KSO_WM_DIAGRAM_COLOR_TRICK" val="1"/>
+  <p:tag name="KSO_WM_DIAGRAM_COLOR_TEXT_CAN_REMOVE" val="n"/>
+  <p:tag name="KSO_WM_DIAGRAM_GROUP_CODE" val="n1-1"/>
+  <p:tag name="KSO_WM_UNIT_TYPE" val="n_h_i"/>
+  <p:tag name="KSO_WM_UNIT_INDEX" val="1_1_1"/>
+  <p:tag name="KSO_WM_DIAGRAM_MAX_ITEMCNT" val="6"/>
+  <p:tag name="KSO_WM_DIAGRAM_MIN_ITEMCNT" val="2"/>
+  <p:tag name="KSO_WM_DIAGRAM_VIRTUALLY_FRAME" val="{&quot;height&quot;:372.9,&quot;left&quot;:53.57498779296875,&quot;top&quot;:83.6,&quot;width&quot;:852.9000244140625}"/>
+  <p:tag name="KSO_WM_DIAGRAM_COLOR_MATCH_VALUE" val="{&quot;shape&quot;:{&quot;fill&quot;:{&quot;gradient&quot;:[{&quot;brightness&quot;:0.800000011920929,&quot;colorType&quot;:1,&quot;foreColorIndex&quot;:5,&quot;pos&quot;:0,&quot;transparency&quot;:1},{&quot;brightness&quot;:0.800000011920929,&quot;colorType&quot;:1,&quot;foreColorIndex&quot;:5,&quot;pos&quot;:1,&quot;transparency&quot;:0.49000000953674316}],&quot;type&quot;:3},&quot;glow&quot;:{&quot;colorType&quot;:0},&quot;line&quot;:{&quot;type&quot;:0},&quot;shadow&quot;:{&quot;colorType&quot;:0},&quot;threeD&quot;:{&quot;curvedSurface&quot;:{&quot;brightness&quot;:0,&quot;colorType&quot;:2,&quot;rgb&quot;:&quot;#000000&quot;},&quot;depth&quot;:{&quot;colorType&quot;:0}}},&quot;text&quot;:{&quot;fill&quot;:{&quot;solid&quot;:{&quot;brightness&quot;:0,&quot;colorType&quot;:1,&quot;foreColorIndex&quot;:2,&quot;transparency&quot;:0},&quot;type&quot;:1},&quot;glow&quot;:{&quot;colorType&quot;:0},&quot;line&quot;:{&quot;type&quot;:0},&quot;shadow&quot;:{&quot;colorType&quot;:0},&quot;threeD&quot;:{&quot;curvedSurface&quot;:{&quot;brightness&quot;:0,&quot;colorType&quot;:2,&quot;rgb&quot;:&quot;#000000&quot;},&quot;depth&quot;:{&quot;colorType&quot;:0}}}}"/>
+  <p:tag name="KSO_WM_UNIT_FILL_TYPE" val="3"/>
+  <p:tag name="KSO_WM_DIAGRAM_USE_COLOR_VALUE" val="{&quot;color_scheme&quot;:1,&quot;color_type&quot;:1,&quot;theme_color_indexes&quot;:[]}"/>
+</p:tagLst>
+</file>
+
+<file path=ppt/tags/tag5.xml><?xml version="1.0" encoding="utf-8"?>
+<p:tagLst xmlns:p="http://schemas.openxmlformats.org/presentationml/2006/main">
+  <p:tag name="KSO_WM_UNIT_HIGHLIGHT" val="0"/>
+  <p:tag name="KSO_WM_UNIT_COMPATIBLE" val="0"/>
+  <p:tag name="KSO_WM_UNIT_DIAGRAM_ISNUMVISUAL" val="0"/>
+  <p:tag name="KSO_WM_UNIT_DIAGRAM_ISREFERUNIT" val="0"/>
+  <p:tag name="KSO_WM_UNIT_ID" val="diagram20238176_2*n_h_h_i*1_2_3_2"/>
+  <p:tag name="KSO_WM_TEMPLATE_CATEGORY" val="diagram"/>
+  <p:tag name="KSO_WM_TEMPLATE_INDEX" val="20238176"/>
+  <p:tag name="KSO_WM_UNIT_LAYERLEVEL" val="1_1_1_1"/>
+  <p:tag name="KSO_WM_TAG_VERSION" val="3.0"/>
+  <p:tag name="KSO_WM_DIAGRAM_VERSION" val="3"/>
+  <p:tag name="KSO_WM_DIAGRAM_COLOR_TRICK" val="1"/>
+  <p:tag name="KSO_WM_DIAGRAM_COLOR_TEXT_CAN_REMOVE" val="n"/>
+  <p:tag name="KSO_WM_DIAGRAM_GROUP_CODE" val="n1-1"/>
+  <p:tag name="KSO_WM_UNIT_TYPE" val="n_h_h_i"/>
+  <p:tag name="KSO_WM_UNIT_INDEX" val="1_2_3_2"/>
+  <p:tag name="KSO_WM_DIAGRAM_MAX_ITEMCNT" val="6"/>
+  <p:tag name="KSO_WM_DIAGRAM_MIN_ITEMCNT" val="2"/>
+  <p:tag name="KSO_WM_DIAGRAM_VIRTUALLY_FRAME" val="{&quot;height&quot;:372.9,&quot;left&quot;:53.57498779296875,&quot;top&quot;:83.6,&quot;width&quot;:852.9000244140625}"/>
+  <p:tag name="KSO_WM_DIAGRAM_COLOR_MATCH_VALUE" val="{&quot;shape&quot;:{&quot;fill&quot;:{&quot;type&quot;:0},&quot;glow&quot;:{&quot;colorType&quot;:0},&quot;line&quot;:{&quot;gradient&quot;:[{&quot;brightness&quot;:0,&quot;colorType&quot;:1,&quot;foreColorIndex&quot;:5,&quot;pos&quot;:0,&quot;transparency&quot;:1},{&quot;brightness&quot;:0,&quot;colorType&quot;:1,&quot;foreColorIndex&quot;:5,&quot;pos&quot;:0.6000000238418579,&quot;transparency&quot;:0}],&quot;type&quot;:2},&quot;shadow&quot;:{&quot;brightness&quot;:-0.25,&quot;colorType&quot;:1,&quot;foreColorIndex&quot;:5,&quot;transparency&quot;:0.6000000238418579},&quot;threeD&quot;:{&quot;curvedSurface&quot;:{&quot;brightness&quot;:0,&quot;colorType&quot;:2,&quot;rgb&quot;:&quot;#000000&quot;},&quot;depth&quot;:{&quot;colorType&quot;:0}}},&quot;text&quot;:{&quot;fill&quot;:{&quot;solid&quot;:{&quot;brightness&quot;:0,&quot;colorType&quot;:1,&quot;foreColorIndex&quot;:13,&quot;transparency&quot;:0},&quot;type&quot;:1},&quot;glow&quot;:{&quot;colorType&quot;:0},&quot;line&quot;:{&quot;type&quot;:0},&quot;shadow&quot;:{&quot;colorType&quot;:0},&quot;threeD&quot;:{&quot;curvedSurface&quot;:{&quot;brightness&quot;:0,&quot;colorType&quot;:2,&quot;rgb&quot;:&quot;#000000&quot;},&quot;depth&quot;:{&quot;colorType&quot;:0}}}}"/>
+  <p:tag name="KSO_WM_DIAGRAM_USE_COLOR_VALUE" val="{&quot;color_scheme&quot;:1,&quot;color_type&quot;:1,&quot;theme_color_indexes&quot;:[]}"/>
+</p:tagLst>
+</file>
+
+<file path=ppt/tags/tag6.xml><?xml version="1.0" encoding="utf-8"?>
+<p:tagLst xmlns:p="http://schemas.openxmlformats.org/presentationml/2006/main">
+  <p:tag name="KSO_WM_UNIT_HIGHLIGHT" val="0"/>
+  <p:tag name="KSO_WM_UNIT_COMPATIBLE" val="0"/>
+  <p:tag name="KSO_WM_UNIT_DIAGRAM_ISNUMVISUAL" val="0"/>
+  <p:tag name="KSO_WM_UNIT_DIAGRAM_ISREFERUNIT" val="0"/>
+  <p:tag name="KSO_WM_UNIT_ID" val="diagram20238176_2*n_h_i*1_1_3"/>
+  <p:tag name="KSO_WM_TEMPLATE_CATEGORY" val="diagram"/>
+  <p:tag name="KSO_WM_TEMPLATE_INDEX" val="20238176"/>
+  <p:tag name="KSO_WM_UNIT_LAYERLEVEL" val="1_1_1"/>
+  <p:tag name="KSO_WM_TAG_VERSION" val="3.0"/>
+  <p:tag name="KSO_WM_DIAGRAM_VERSION" val="3"/>
+  <p:tag name="KSO_WM_DIAGRAM_COLOR_TRICK" val="1"/>
+  <p:tag name="KSO_WM_DIAGRAM_COLOR_TEXT_CAN_REMOVE" val="n"/>
+  <p:tag name="KSO_WM_DIAGRAM_GROUP_CODE" val="n1-1"/>
+  <p:tag name="KSO_WM_UNIT_TYPE" val="n_h_i"/>
+  <p:tag name="KSO_WM_UNIT_INDEX" val="1_1_3"/>
+  <p:tag name="KSO_WM_DIAGRAM_MAX_ITEMCNT" val="6"/>
+  <p:tag name="KSO_WM_DIAGRAM_MIN_ITEMCNT" val="2"/>
+  <p:tag name="KSO_WM_DIAGRAM_VIRTUALLY_FRAME" val="{&quot;height&quot;:372.9,&quot;left&quot;:53.57498779296875,&quot;top&quot;:83.6,&quot;width&quot;:852.9000244140625}"/>
+  <p:tag name="KSO_WM_DIAGRAM_COLOR_MATCH_VALUE" val="{&quot;shape&quot;:{&quot;fill&quot;:{&quot;type&quot;:0},&quot;glow&quot;:{&quot;colorType&quot;:0},&quot;line&quot;:{&quot;solidLine&quot;:{&quot;brightness&quot;:0,&quot;colorType&quot;:1,&quot;foreColorIndex&quot;:5,&quot;transparency&quot;:0},&quot;type&quot;:1},&quot;shadow&quot;:{&quot;brightness&quot;:0,&quot;colorType&quot;:1,&quot;foreColorIndex&quot;:5,&quot;transparency&quot;:0.6000000238418579},&quot;threeD&quot;:{&quot;curvedSurface&quot;:{&quot;brightness&quot;:0,&quot;colorType&quot;:2,&quot;rgb&quot;:&quot;#000000&quot;},&quot;depth&quot;:{&quot;colorType&quot;:0}}},&quot;text&quot;:{&quot;fill&quot;:{&quot;solid&quot;:{&quot;brightness&quot;:0,&quot;colorType&quot;:1,&quot;foreColorIndex&quot;:2,&quot;transparency&quot;:0},&quot;type&quot;:1},&quot;glow&quot;:{&quot;colorType&quot;:0},&quot;line&quot;:{&quot;type&quot;:0},&quot;shadow&quot;:{&quot;colorType&quot;:0},&quot;threeD&quot;:{&quot;curvedSurface&quot;:{&quot;brightness&quot;:0,&quot;colorType&quot;:2,&quot;rgb&quot;:&quot;#000000&quot;},&quot;depth&quot;:{&quot;colorType&quot;:0}}}}"/>
+  <p:tag name="KSO_WM_UNIT_LINE_FORE_SCHEMECOLOR_INDEX" val="5"/>
+  <p:tag name="KSO_WM_DIAGRAM_USE_COLOR_VALUE" val="{&quot;color_scheme&quot;:1,&quot;color_type&quot;:1,&quot;theme_color_indexes&quot;:[]}"/>
+</p:tagLst>
+</file>
+
+<file path=ppt/tags/tag7.xml><?xml version="1.0" encoding="utf-8"?>
+<p:tagLst xmlns:p="http://schemas.openxmlformats.org/presentationml/2006/main">
+  <p:tag name="resource_record_key" val="{&quot;70&quot;:[3321980]}"/>
+</p:tagLst>
 </file>
 
 <file path=ppt/theme/theme1.xml><?xml version="1.0" encoding="utf-8"?>
@@ -3058,7 +4794,7 @@
     </a:clrScheme>
     <a:fontScheme name="Office">
       <a:majorFont>
-        <a:latin typeface="Calibri Light" panose="020F0302020204030204"/>
+        <a:latin typeface="Calibri Light"/>
         <a:ea typeface=""/>
         <a:cs typeface=""/>
         <a:font script="Jpan" typeface="ＭＳ Ｐゴシック"/>
@@ -3093,7 +4829,7 @@
         <a:font script="Geor" typeface="Sylfaen"/>
       </a:majorFont>
       <a:minorFont>
-        <a:latin typeface="Calibri" panose="020F0502020204030204"/>
+        <a:latin typeface="Calibri"/>
         <a:ea typeface=""/>
         <a:cs typeface=""/>
         <a:font script="Jpan" typeface="ＭＳ Ｐゴシック"/>
@@ -3266,8 +5002,6 @@
       </a:bgFillStyleLst>
     </a:fmtScheme>
   </a:themeElements>
-  <a:objectDefaults/>
-  <a:extraClrSchemeLst/>
   <a:extLst>
     <a:ext uri="{05A4C25C-085E-4340-85A3-A5531E510DB2}">
       <thm15:themeFamily xmlns:thm15="http://schemas.microsoft.com/office/thememl/2012/main" name="Office Theme" id="{62F939B6-93AF-4DB8-9C6B-D6C7DFDC589F}" vid="{4A3C46E8-61CC-4603-A589-7422A47A8E4A}"/>

</xml_diff>